<commit_message>
add intro to dataset for lab 9
</commit_message>
<xml_diff>
--- a/classes/stats2019/Lecture09.pptx
+++ b/classes/stats2019/Lecture09.pptx
@@ -5,7 +5,7 @@
     <p:sldMasterId id="2147483648" r:id="rId1"/>
   </p:sldMasterIdLst>
   <p:notesMasterIdLst>
-    <p:notesMasterId r:id="rId31"/>
+    <p:notesMasterId r:id="rId43"/>
   </p:notesMasterIdLst>
   <p:sldIdLst>
     <p:sldId id="256" r:id="rId2"/>
@@ -37,6 +37,18 @@
     <p:sldId id="288" r:id="rId28"/>
     <p:sldId id="289" r:id="rId29"/>
     <p:sldId id="290" r:id="rId30"/>
+    <p:sldId id="291" r:id="rId31"/>
+    <p:sldId id="257" r:id="rId32"/>
+    <p:sldId id="259" r:id="rId33"/>
+    <p:sldId id="292" r:id="rId34"/>
+    <p:sldId id="258" r:id="rId35"/>
+    <p:sldId id="293" r:id="rId36"/>
+    <p:sldId id="294" r:id="rId37"/>
+    <p:sldId id="266" r:id="rId38"/>
+    <p:sldId id="295" r:id="rId39"/>
+    <p:sldId id="296" r:id="rId40"/>
+    <p:sldId id="297" r:id="rId41"/>
+    <p:sldId id="298" r:id="rId42"/>
   </p:sldIdLst>
   <p:sldSz cx="9144000" cy="6858000" type="screen4x3"/>
   <p:notesSz cx="6858000" cy="9144000"/>
@@ -759,6 +771,528 @@
     <p:extLst>
       <p:ext uri="{BB962C8B-B14F-4D97-AF65-F5344CB8AC3E}">
         <p14:creationId xmlns:p14="http://schemas.microsoft.com/office/powerpoint/2010/main" val="3381308913"/>
+      </p:ext>
+    </p:extLst>
+  </p:cSld>
+  <p:clrMapOvr>
+    <a:masterClrMapping/>
+  </p:clrMapOvr>
+</p:notes>
+</file>
+
+<file path=ppt/notesSlides/notesSlide4.xml><?xml version="1.0" encoding="utf-8"?>
+<p:notes xmlns:a="http://schemas.openxmlformats.org/drawingml/2006/main" xmlns:r="http://schemas.openxmlformats.org/officeDocument/2006/relationships" xmlns:p="http://schemas.openxmlformats.org/presentationml/2006/main">
+  <p:cSld>
+    <p:spTree>
+      <p:nvGrpSpPr>
+        <p:cNvPr id="1" name=""/>
+        <p:cNvGrpSpPr/>
+        <p:nvPr/>
+      </p:nvGrpSpPr>
+      <p:grpSpPr>
+        <a:xfrm>
+          <a:off x="0" y="0"/>
+          <a:ext cx="0" cy="0"/>
+          <a:chOff x="0" y="0"/>
+          <a:chExt cx="0" cy="0"/>
+        </a:xfrm>
+      </p:grpSpPr>
+      <p:sp>
+        <p:nvSpPr>
+          <p:cNvPr id="2" name="Slide Image Placeholder 1"/>
+          <p:cNvSpPr>
+            <a:spLocks noGrp="1" noRot="1" noChangeAspect="1"/>
+          </p:cNvSpPr>
+          <p:nvPr>
+            <p:ph type="sldImg"/>
+          </p:nvPr>
+        </p:nvSpPr>
+        <p:spPr/>
+      </p:sp>
+      <p:sp>
+        <p:nvSpPr>
+          <p:cNvPr id="3" name="Notes Placeholder 2"/>
+          <p:cNvSpPr>
+            <a:spLocks noGrp="1"/>
+          </p:cNvSpPr>
+          <p:nvPr>
+            <p:ph type="body" idx="1"/>
+          </p:nvPr>
+        </p:nvSpPr>
+        <p:spPr/>
+        <p:txBody>
+          <a:bodyPr>
+            <a:normAutofit/>
+          </a:bodyPr>
+          <a:lstStyle/>
+          <a:p>
+            <a:endParaRPr lang="en-US"/>
+          </a:p>
+        </p:txBody>
+      </p:sp>
+      <p:sp>
+        <p:nvSpPr>
+          <p:cNvPr id="4" name="Slide Number Placeholder 3"/>
+          <p:cNvSpPr>
+            <a:spLocks noGrp="1"/>
+          </p:cNvSpPr>
+          <p:nvPr>
+            <p:ph type="sldNum" sz="quarter" idx="10"/>
+          </p:nvPr>
+        </p:nvSpPr>
+        <p:spPr/>
+        <p:txBody>
+          <a:bodyPr/>
+          <a:lstStyle/>
+          <a:p>
+            <a:fld id="{AB346639-E415-41BD-BB4E-0085BA32E2D5}" type="slidenum">
+              <a:rPr lang="en-US" smtClean="0"/>
+              <a:pPr/>
+              <a:t>34</a:t>
+            </a:fld>
+            <a:endParaRPr lang="en-US"/>
+          </a:p>
+        </p:txBody>
+      </p:sp>
+    </p:spTree>
+    <p:extLst>
+      <p:ext uri="{BB962C8B-B14F-4D97-AF65-F5344CB8AC3E}">
+        <p14:creationId xmlns:p14="http://schemas.microsoft.com/office/powerpoint/2010/main" val="4137265357"/>
+      </p:ext>
+    </p:extLst>
+  </p:cSld>
+  <p:clrMapOvr>
+    <a:masterClrMapping/>
+  </p:clrMapOvr>
+</p:notes>
+</file>
+
+<file path=ppt/notesSlides/notesSlide5.xml><?xml version="1.0" encoding="utf-8"?>
+<p:notes xmlns:a="http://schemas.openxmlformats.org/drawingml/2006/main" xmlns:r="http://schemas.openxmlformats.org/officeDocument/2006/relationships" xmlns:p="http://schemas.openxmlformats.org/presentationml/2006/main">
+  <p:cSld>
+    <p:spTree>
+      <p:nvGrpSpPr>
+        <p:cNvPr id="1" name=""/>
+        <p:cNvGrpSpPr/>
+        <p:nvPr/>
+      </p:nvGrpSpPr>
+      <p:grpSpPr>
+        <a:xfrm>
+          <a:off x="0" y="0"/>
+          <a:ext cx="0" cy="0"/>
+          <a:chOff x="0" y="0"/>
+          <a:chExt cx="0" cy="0"/>
+        </a:xfrm>
+      </p:grpSpPr>
+      <p:sp>
+        <p:nvSpPr>
+          <p:cNvPr id="2" name="Slide Image Placeholder 1"/>
+          <p:cNvSpPr>
+            <a:spLocks noGrp="1" noRot="1" noChangeAspect="1"/>
+          </p:cNvSpPr>
+          <p:nvPr>
+            <p:ph type="sldImg"/>
+          </p:nvPr>
+        </p:nvSpPr>
+        <p:spPr/>
+      </p:sp>
+      <p:sp>
+        <p:nvSpPr>
+          <p:cNvPr id="3" name="Notes Placeholder 2"/>
+          <p:cNvSpPr>
+            <a:spLocks noGrp="1"/>
+          </p:cNvSpPr>
+          <p:nvPr>
+            <p:ph type="body" idx="1"/>
+          </p:nvPr>
+        </p:nvSpPr>
+        <p:spPr/>
+        <p:txBody>
+          <a:bodyPr>
+            <a:normAutofit/>
+          </a:bodyPr>
+          <a:lstStyle/>
+          <a:p>
+            <a:endParaRPr lang="en-US"/>
+          </a:p>
+        </p:txBody>
+      </p:sp>
+      <p:sp>
+        <p:nvSpPr>
+          <p:cNvPr id="4" name="Slide Number Placeholder 3"/>
+          <p:cNvSpPr>
+            <a:spLocks noGrp="1"/>
+          </p:cNvSpPr>
+          <p:nvPr>
+            <p:ph type="sldNum" sz="quarter" idx="10"/>
+          </p:nvPr>
+        </p:nvSpPr>
+        <p:spPr/>
+        <p:txBody>
+          <a:bodyPr/>
+          <a:lstStyle/>
+          <a:p>
+            <a:fld id="{AB346639-E415-41BD-BB4E-0085BA32E2D5}" type="slidenum">
+              <a:rPr lang="en-US" smtClean="0"/>
+              <a:pPr/>
+              <a:t>36</a:t>
+            </a:fld>
+            <a:endParaRPr lang="en-US"/>
+          </a:p>
+        </p:txBody>
+      </p:sp>
+    </p:spTree>
+    <p:extLst>
+      <p:ext uri="{BB962C8B-B14F-4D97-AF65-F5344CB8AC3E}">
+        <p14:creationId xmlns:p14="http://schemas.microsoft.com/office/powerpoint/2010/main" val="3901428471"/>
+      </p:ext>
+    </p:extLst>
+  </p:cSld>
+  <p:clrMapOvr>
+    <a:masterClrMapping/>
+  </p:clrMapOvr>
+</p:notes>
+</file>
+
+<file path=ppt/notesSlides/notesSlide6.xml><?xml version="1.0" encoding="utf-8"?>
+<p:notes xmlns:a="http://schemas.openxmlformats.org/drawingml/2006/main" xmlns:r="http://schemas.openxmlformats.org/officeDocument/2006/relationships" xmlns:p="http://schemas.openxmlformats.org/presentationml/2006/main">
+  <p:cSld>
+    <p:spTree>
+      <p:nvGrpSpPr>
+        <p:cNvPr id="1" name=""/>
+        <p:cNvGrpSpPr/>
+        <p:nvPr/>
+      </p:nvGrpSpPr>
+      <p:grpSpPr>
+        <a:xfrm>
+          <a:off x="0" y="0"/>
+          <a:ext cx="0" cy="0"/>
+          <a:chOff x="0" y="0"/>
+          <a:chExt cx="0" cy="0"/>
+        </a:xfrm>
+      </p:grpSpPr>
+      <p:sp>
+        <p:nvSpPr>
+          <p:cNvPr id="2" name="Slide Image Placeholder 1"/>
+          <p:cNvSpPr>
+            <a:spLocks noGrp="1" noRot="1" noChangeAspect="1"/>
+          </p:cNvSpPr>
+          <p:nvPr>
+            <p:ph type="sldImg"/>
+          </p:nvPr>
+        </p:nvSpPr>
+        <p:spPr/>
+      </p:sp>
+      <p:sp>
+        <p:nvSpPr>
+          <p:cNvPr id="3" name="Notes Placeholder 2"/>
+          <p:cNvSpPr>
+            <a:spLocks noGrp="1"/>
+          </p:cNvSpPr>
+          <p:nvPr>
+            <p:ph type="body" idx="1"/>
+          </p:nvPr>
+        </p:nvSpPr>
+        <p:spPr/>
+        <p:txBody>
+          <a:bodyPr>
+            <a:normAutofit/>
+          </a:bodyPr>
+          <a:lstStyle/>
+          <a:p>
+            <a:endParaRPr lang="en-US"/>
+          </a:p>
+        </p:txBody>
+      </p:sp>
+      <p:sp>
+        <p:nvSpPr>
+          <p:cNvPr id="4" name="Slide Number Placeholder 3"/>
+          <p:cNvSpPr>
+            <a:spLocks noGrp="1"/>
+          </p:cNvSpPr>
+          <p:nvPr>
+            <p:ph type="sldNum" sz="quarter" idx="10"/>
+          </p:nvPr>
+        </p:nvSpPr>
+        <p:spPr/>
+        <p:txBody>
+          <a:bodyPr/>
+          <a:lstStyle/>
+          <a:p>
+            <a:fld id="{AB346639-E415-41BD-BB4E-0085BA32E2D5}" type="slidenum">
+              <a:rPr lang="en-US" smtClean="0"/>
+              <a:pPr/>
+              <a:t>38</a:t>
+            </a:fld>
+            <a:endParaRPr lang="en-US"/>
+          </a:p>
+        </p:txBody>
+      </p:sp>
+    </p:spTree>
+    <p:extLst>
+      <p:ext uri="{BB962C8B-B14F-4D97-AF65-F5344CB8AC3E}">
+        <p14:creationId xmlns:p14="http://schemas.microsoft.com/office/powerpoint/2010/main" val="2601810066"/>
+      </p:ext>
+    </p:extLst>
+  </p:cSld>
+  <p:clrMapOvr>
+    <a:masterClrMapping/>
+  </p:clrMapOvr>
+</p:notes>
+</file>
+
+<file path=ppt/notesSlides/notesSlide7.xml><?xml version="1.0" encoding="utf-8"?>
+<p:notes xmlns:a="http://schemas.openxmlformats.org/drawingml/2006/main" xmlns:r="http://schemas.openxmlformats.org/officeDocument/2006/relationships" xmlns:p="http://schemas.openxmlformats.org/presentationml/2006/main">
+  <p:cSld>
+    <p:spTree>
+      <p:nvGrpSpPr>
+        <p:cNvPr id="1" name=""/>
+        <p:cNvGrpSpPr/>
+        <p:nvPr/>
+      </p:nvGrpSpPr>
+      <p:grpSpPr>
+        <a:xfrm>
+          <a:off x="0" y="0"/>
+          <a:ext cx="0" cy="0"/>
+          <a:chOff x="0" y="0"/>
+          <a:chExt cx="0" cy="0"/>
+        </a:xfrm>
+      </p:grpSpPr>
+      <p:sp>
+        <p:nvSpPr>
+          <p:cNvPr id="2" name="Slide Image Placeholder 1"/>
+          <p:cNvSpPr>
+            <a:spLocks noGrp="1" noRot="1" noChangeAspect="1"/>
+          </p:cNvSpPr>
+          <p:nvPr>
+            <p:ph type="sldImg"/>
+          </p:nvPr>
+        </p:nvSpPr>
+        <p:spPr/>
+      </p:sp>
+      <p:sp>
+        <p:nvSpPr>
+          <p:cNvPr id="3" name="Notes Placeholder 2"/>
+          <p:cNvSpPr>
+            <a:spLocks noGrp="1"/>
+          </p:cNvSpPr>
+          <p:nvPr>
+            <p:ph type="body" idx="1"/>
+          </p:nvPr>
+        </p:nvSpPr>
+        <p:spPr/>
+        <p:txBody>
+          <a:bodyPr>
+            <a:normAutofit/>
+          </a:bodyPr>
+          <a:lstStyle/>
+          <a:p>
+            <a:endParaRPr lang="en-US"/>
+          </a:p>
+        </p:txBody>
+      </p:sp>
+      <p:sp>
+        <p:nvSpPr>
+          <p:cNvPr id="4" name="Slide Number Placeholder 3"/>
+          <p:cNvSpPr>
+            <a:spLocks noGrp="1"/>
+          </p:cNvSpPr>
+          <p:nvPr>
+            <p:ph type="sldNum" sz="quarter" idx="10"/>
+          </p:nvPr>
+        </p:nvSpPr>
+        <p:spPr/>
+        <p:txBody>
+          <a:bodyPr/>
+          <a:lstStyle/>
+          <a:p>
+            <a:fld id="{A2E50C88-8C23-4B05-8F39-C201E1FB796E}" type="slidenum">
+              <a:rPr lang="en-US" smtClean="0"/>
+              <a:pPr/>
+              <a:t>39</a:t>
+            </a:fld>
+            <a:endParaRPr lang="en-US"/>
+          </a:p>
+        </p:txBody>
+      </p:sp>
+    </p:spTree>
+    <p:extLst>
+      <p:ext uri="{BB962C8B-B14F-4D97-AF65-F5344CB8AC3E}">
+        <p14:creationId xmlns:p14="http://schemas.microsoft.com/office/powerpoint/2010/main" val="3572320960"/>
+      </p:ext>
+    </p:extLst>
+  </p:cSld>
+  <p:clrMapOvr>
+    <a:masterClrMapping/>
+  </p:clrMapOvr>
+</p:notes>
+</file>
+
+<file path=ppt/notesSlides/notesSlide8.xml><?xml version="1.0" encoding="utf-8"?>
+<p:notes xmlns:a="http://schemas.openxmlformats.org/drawingml/2006/main" xmlns:r="http://schemas.openxmlformats.org/officeDocument/2006/relationships" xmlns:p="http://schemas.openxmlformats.org/presentationml/2006/main">
+  <p:cSld>
+    <p:spTree>
+      <p:nvGrpSpPr>
+        <p:cNvPr id="1" name=""/>
+        <p:cNvGrpSpPr/>
+        <p:nvPr/>
+      </p:nvGrpSpPr>
+      <p:grpSpPr>
+        <a:xfrm>
+          <a:off x="0" y="0"/>
+          <a:ext cx="0" cy="0"/>
+          <a:chOff x="0" y="0"/>
+          <a:chExt cx="0" cy="0"/>
+        </a:xfrm>
+      </p:grpSpPr>
+      <p:sp>
+        <p:nvSpPr>
+          <p:cNvPr id="2" name="Slide Image Placeholder 1"/>
+          <p:cNvSpPr>
+            <a:spLocks noGrp="1" noRot="1" noChangeAspect="1"/>
+          </p:cNvSpPr>
+          <p:nvPr>
+            <p:ph type="sldImg"/>
+          </p:nvPr>
+        </p:nvSpPr>
+        <p:spPr/>
+      </p:sp>
+      <p:sp>
+        <p:nvSpPr>
+          <p:cNvPr id="3" name="Notes Placeholder 2"/>
+          <p:cNvSpPr>
+            <a:spLocks noGrp="1"/>
+          </p:cNvSpPr>
+          <p:nvPr>
+            <p:ph type="body" idx="1"/>
+          </p:nvPr>
+        </p:nvSpPr>
+        <p:spPr/>
+        <p:txBody>
+          <a:bodyPr>
+            <a:normAutofit/>
+          </a:bodyPr>
+          <a:lstStyle/>
+          <a:p>
+            <a:endParaRPr lang="en-US"/>
+          </a:p>
+        </p:txBody>
+      </p:sp>
+      <p:sp>
+        <p:nvSpPr>
+          <p:cNvPr id="4" name="Slide Number Placeholder 3"/>
+          <p:cNvSpPr>
+            <a:spLocks noGrp="1"/>
+          </p:cNvSpPr>
+          <p:nvPr>
+            <p:ph type="sldNum" sz="quarter" idx="10"/>
+          </p:nvPr>
+        </p:nvSpPr>
+        <p:spPr/>
+        <p:txBody>
+          <a:bodyPr/>
+          <a:lstStyle/>
+          <a:p>
+            <a:fld id="{A2E50C88-8C23-4B05-8F39-C201E1FB796E}" type="slidenum">
+              <a:rPr lang="en-US" smtClean="0"/>
+              <a:pPr/>
+              <a:t>40</a:t>
+            </a:fld>
+            <a:endParaRPr lang="en-US"/>
+          </a:p>
+        </p:txBody>
+      </p:sp>
+    </p:spTree>
+    <p:extLst>
+      <p:ext uri="{BB962C8B-B14F-4D97-AF65-F5344CB8AC3E}">
+        <p14:creationId xmlns:p14="http://schemas.microsoft.com/office/powerpoint/2010/main" val="3939696595"/>
+      </p:ext>
+    </p:extLst>
+  </p:cSld>
+  <p:clrMapOvr>
+    <a:masterClrMapping/>
+  </p:clrMapOvr>
+</p:notes>
+</file>
+
+<file path=ppt/notesSlides/notesSlide9.xml><?xml version="1.0" encoding="utf-8"?>
+<p:notes xmlns:a="http://schemas.openxmlformats.org/drawingml/2006/main" xmlns:r="http://schemas.openxmlformats.org/officeDocument/2006/relationships" xmlns:p="http://schemas.openxmlformats.org/presentationml/2006/main">
+  <p:cSld>
+    <p:spTree>
+      <p:nvGrpSpPr>
+        <p:cNvPr id="1" name=""/>
+        <p:cNvGrpSpPr/>
+        <p:nvPr/>
+      </p:nvGrpSpPr>
+      <p:grpSpPr>
+        <a:xfrm>
+          <a:off x="0" y="0"/>
+          <a:ext cx="0" cy="0"/>
+          <a:chOff x="0" y="0"/>
+          <a:chExt cx="0" cy="0"/>
+        </a:xfrm>
+      </p:grpSpPr>
+      <p:sp>
+        <p:nvSpPr>
+          <p:cNvPr id="2" name="Slide Image Placeholder 1"/>
+          <p:cNvSpPr>
+            <a:spLocks noGrp="1" noRot="1" noChangeAspect="1"/>
+          </p:cNvSpPr>
+          <p:nvPr>
+            <p:ph type="sldImg"/>
+          </p:nvPr>
+        </p:nvSpPr>
+        <p:spPr/>
+      </p:sp>
+      <p:sp>
+        <p:nvSpPr>
+          <p:cNvPr id="3" name="Notes Placeholder 2"/>
+          <p:cNvSpPr>
+            <a:spLocks noGrp="1"/>
+          </p:cNvSpPr>
+          <p:nvPr>
+            <p:ph type="body" idx="1"/>
+          </p:nvPr>
+        </p:nvSpPr>
+        <p:spPr/>
+        <p:txBody>
+          <a:bodyPr>
+            <a:normAutofit/>
+          </a:bodyPr>
+          <a:lstStyle/>
+          <a:p>
+            <a:endParaRPr lang="en-US"/>
+          </a:p>
+        </p:txBody>
+      </p:sp>
+      <p:sp>
+        <p:nvSpPr>
+          <p:cNvPr id="4" name="Slide Number Placeholder 3"/>
+          <p:cNvSpPr>
+            <a:spLocks noGrp="1"/>
+          </p:cNvSpPr>
+          <p:nvPr>
+            <p:ph type="sldNum" sz="quarter" idx="10"/>
+          </p:nvPr>
+        </p:nvSpPr>
+        <p:spPr/>
+        <p:txBody>
+          <a:bodyPr/>
+          <a:lstStyle/>
+          <a:p>
+            <a:fld id="{A2E50C88-8C23-4B05-8F39-C201E1FB796E}" type="slidenum">
+              <a:rPr lang="en-US" smtClean="0"/>
+              <a:pPr/>
+              <a:t>41</a:t>
+            </a:fld>
+            <a:endParaRPr lang="en-US"/>
+          </a:p>
+        </p:txBody>
+      </p:sp>
+    </p:spTree>
+    <p:extLst>
+      <p:ext uri="{BB962C8B-B14F-4D97-AF65-F5344CB8AC3E}">
+        <p14:creationId xmlns:p14="http://schemas.microsoft.com/office/powerpoint/2010/main" val="2463271866"/>
       </p:ext>
     </p:extLst>
   </p:cSld>
@@ -3708,7 +4242,7 @@
         <p:spPr>
           <a:xfrm>
             <a:off x="304800" y="228600"/>
-            <a:ext cx="8885894" cy="1200329"/>
+            <a:ext cx="8885894" cy="1477328"/>
           </a:xfrm>
           <a:prstGeom prst="rect">
             <a:avLst/>
@@ -3744,6 +4278,12 @@
             <a:r>
               <a:rPr lang="en-US" dirty="0"/>
               <a:t> and negative binomial inference</a:t>
+            </a:r>
+          </a:p>
+          <a:p>
+            <a:r>
+              <a:rPr lang="en-US" dirty="0"/>
+              <a:t>Dataset for the next lab </a:t>
             </a:r>
           </a:p>
           <a:p>
@@ -5411,14 +5951,20 @@
       </p:grpSpPr>
       <p:sp>
         <p:nvSpPr>
-          <p:cNvPr id="5" name="TextBox 4"/>
+          <p:cNvPr id="4" name="TextBox 3">
+            <a:extLst>
+              <a:ext uri="{FF2B5EF4-FFF2-40B4-BE49-F238E27FC236}">
+                <a16:creationId xmlns:a16="http://schemas.microsoft.com/office/drawing/2014/main" id="{F37BE5E6-C240-4D2E-BB05-87D02376A3E2}"/>
+              </a:ext>
+            </a:extLst>
+          </p:cNvPr>
           <p:cNvSpPr txBox="1"/>
           <p:nvPr/>
         </p:nvSpPr>
         <p:spPr>
           <a:xfrm>
             <a:off x="304800" y="228600"/>
-            <a:ext cx="8885894" cy="1200329"/>
+            <a:ext cx="8885894" cy="1477328"/>
           </a:xfrm>
           <a:prstGeom prst="rect">
             <a:avLst/>
@@ -5433,7 +5979,7 @@
           <a:p>
             <a:r>
               <a:rPr lang="en-US" dirty="0"/>
-              <a:t>Better visualization of the Metropolitan algorithm</a:t>
+              <a:t>One last prior</a:t>
             </a:r>
           </a:p>
           <a:p>
@@ -5457,20 +6003,32 @@
             </a:r>
           </a:p>
           <a:p>
+            <a:r>
+              <a:rPr lang="en-US" dirty="0"/>
+              <a:t>Dataset for the next lab </a:t>
+            </a:r>
+          </a:p>
+          <a:p>
             <a:endParaRPr lang="en-US" dirty="0"/>
           </a:p>
         </p:txBody>
       </p:sp>
       <p:cxnSp>
         <p:nvCxnSpPr>
-          <p:cNvPr id="7" name="Straight Arrow Connector 6"/>
+          <p:cNvPr id="3" name="Straight Arrow Connector 2">
+            <a:extLst>
+              <a:ext uri="{FF2B5EF4-FFF2-40B4-BE49-F238E27FC236}">
+                <a16:creationId xmlns:a16="http://schemas.microsoft.com/office/drawing/2014/main" id="{82219E86-BB10-413C-9C8D-5BEB093039EF}"/>
+              </a:ext>
+            </a:extLst>
+          </p:cNvPr>
           <p:cNvCxnSpPr/>
           <p:nvPr/>
         </p:nvCxnSpPr>
         <p:spPr>
-          <a:xfrm flipV="1">
-            <a:off x="152400" y="1066800"/>
-            <a:ext cx="304800" cy="362129"/>
+          <a:xfrm flipH="1" flipV="1">
+            <a:off x="7086600" y="1066800"/>
+            <a:ext cx="457200" cy="228600"/>
           </a:xfrm>
           <a:prstGeom prst="straightConnector1">
             <a:avLst/>
@@ -8310,6 +8868,2626 @@
 </p:sld>
 </file>
 
+<file path=ppt/slides/slide30.xml><?xml version="1.0" encoding="utf-8"?>
+<p:sld xmlns:a="http://schemas.openxmlformats.org/drawingml/2006/main" xmlns:r="http://schemas.openxmlformats.org/officeDocument/2006/relationships" xmlns:p="http://schemas.openxmlformats.org/presentationml/2006/main">
+  <p:cSld>
+    <p:spTree>
+      <p:nvGrpSpPr>
+        <p:cNvPr id="1" name=""/>
+        <p:cNvGrpSpPr/>
+        <p:nvPr/>
+      </p:nvGrpSpPr>
+      <p:grpSpPr>
+        <a:xfrm>
+          <a:off x="0" y="0"/>
+          <a:ext cx="0" cy="0"/>
+          <a:chOff x="0" y="0"/>
+          <a:chExt cx="0" cy="0"/>
+        </a:xfrm>
+      </p:grpSpPr>
+      <p:sp>
+        <p:nvSpPr>
+          <p:cNvPr id="5" name="TextBox 4">
+            <a:extLst>
+              <a:ext uri="{FF2B5EF4-FFF2-40B4-BE49-F238E27FC236}">
+                <a16:creationId xmlns:a16="http://schemas.microsoft.com/office/drawing/2014/main" id="{EC57AE49-A74A-4DF7-A295-54C3B62B0A80}"/>
+              </a:ext>
+            </a:extLst>
+          </p:cNvPr>
+          <p:cNvSpPr txBox="1"/>
+          <p:nvPr/>
+        </p:nvSpPr>
+        <p:spPr>
+          <a:xfrm>
+            <a:off x="304800" y="228600"/>
+            <a:ext cx="8885894" cy="1477328"/>
+          </a:xfrm>
+          <a:prstGeom prst="rect">
+            <a:avLst/>
+          </a:prstGeom>
+          <a:noFill/>
+        </p:spPr>
+        <p:txBody>
+          <a:bodyPr wrap="none" rtlCol="0">
+            <a:spAutoFit/>
+          </a:bodyPr>
+          <a:lstStyle/>
+          <a:p>
+            <a:r>
+              <a:rPr lang="en-US" dirty="0"/>
+              <a:t>One last prior</a:t>
+            </a:r>
+          </a:p>
+          <a:p>
+            <a:r>
+              <a:rPr lang="en-US" dirty="0"/>
+              <a:t>The negative binomial distribution</a:t>
+            </a:r>
+          </a:p>
+          <a:p>
+            <a:r>
+              <a:rPr lang="en-US" dirty="0"/>
+              <a:t>Simulating constant and non-constant variance with </a:t>
+            </a:r>
+            <a:r>
+              <a:rPr lang="en-US" dirty="0" err="1"/>
+              <a:t>poisson</a:t>
+            </a:r>
+            <a:r>
+              <a:rPr lang="en-US" dirty="0"/>
+              <a:t> and negative binomial inference</a:t>
+            </a:r>
+          </a:p>
+          <a:p>
+            <a:r>
+              <a:rPr lang="en-US" dirty="0"/>
+              <a:t>Dataset for the next lab </a:t>
+            </a:r>
+          </a:p>
+          <a:p>
+            <a:endParaRPr lang="en-US" dirty="0"/>
+          </a:p>
+        </p:txBody>
+      </p:sp>
+      <p:cxnSp>
+        <p:nvCxnSpPr>
+          <p:cNvPr id="7" name="Straight Arrow Connector 6">
+            <a:extLst>
+              <a:ext uri="{FF2B5EF4-FFF2-40B4-BE49-F238E27FC236}">
+                <a16:creationId xmlns:a16="http://schemas.microsoft.com/office/drawing/2014/main" id="{48226EB9-343F-4DB9-AEA2-E396B11FC4E9}"/>
+              </a:ext>
+            </a:extLst>
+          </p:cNvPr>
+          <p:cNvCxnSpPr/>
+          <p:nvPr/>
+        </p:nvCxnSpPr>
+        <p:spPr>
+          <a:xfrm flipH="1">
+            <a:off x="2590800" y="1219200"/>
+            <a:ext cx="533400" cy="0"/>
+          </a:xfrm>
+          <a:prstGeom prst="straightConnector1">
+            <a:avLst/>
+          </a:prstGeom>
+          <a:ln>
+            <a:tailEnd type="arrow"/>
+          </a:ln>
+        </p:spPr>
+        <p:style>
+          <a:lnRef idx="1">
+            <a:schemeClr val="accent1"/>
+          </a:lnRef>
+          <a:fillRef idx="0">
+            <a:schemeClr val="accent1"/>
+          </a:fillRef>
+          <a:effectRef idx="0">
+            <a:schemeClr val="accent1"/>
+          </a:effectRef>
+          <a:fontRef idx="minor">
+            <a:schemeClr val="tx1"/>
+          </a:fontRef>
+        </p:style>
+      </p:cxnSp>
+    </p:spTree>
+  </p:cSld>
+  <p:clrMapOvr>
+    <a:masterClrMapping/>
+  </p:clrMapOvr>
+</p:sld>
+</file>
+
+<file path=ppt/slides/slide31.xml><?xml version="1.0" encoding="utf-8"?>
+<p:sld xmlns:a="http://schemas.openxmlformats.org/drawingml/2006/main" xmlns:r="http://schemas.openxmlformats.org/officeDocument/2006/relationships" xmlns:p="http://schemas.openxmlformats.org/presentationml/2006/main">
+  <p:cSld>
+    <p:spTree>
+      <p:nvGrpSpPr>
+        <p:cNvPr id="1" name=""/>
+        <p:cNvGrpSpPr/>
+        <p:nvPr/>
+      </p:nvGrpSpPr>
+      <p:grpSpPr>
+        <a:xfrm>
+          <a:off x="0" y="0"/>
+          <a:ext cx="0" cy="0"/>
+          <a:chOff x="0" y="0"/>
+          <a:chExt cx="0" cy="0"/>
+        </a:xfrm>
+      </p:grpSpPr>
+      <p:sp>
+        <p:nvSpPr>
+          <p:cNvPr id="4" name="TextBox 3"/>
+          <p:cNvSpPr txBox="1"/>
+          <p:nvPr/>
+        </p:nvSpPr>
+        <p:spPr>
+          <a:xfrm>
+            <a:off x="533400" y="0"/>
+            <a:ext cx="2547236" cy="369332"/>
+          </a:xfrm>
+          <a:prstGeom prst="rect">
+            <a:avLst/>
+          </a:prstGeom>
+          <a:noFill/>
+        </p:spPr>
+        <p:txBody>
+          <a:bodyPr wrap="none" rtlCol="0">
+            <a:spAutoFit/>
+          </a:bodyPr>
+          <a:lstStyle/>
+          <a:p>
+            <a:r>
+              <a:rPr lang="en-US" dirty="0"/>
+              <a:t>The dataset is at </a:t>
+            </a:r>
+            <a:r>
+              <a:rPr lang="en-US" dirty="0" err="1"/>
+              <a:t>github</a:t>
+            </a:r>
+            <a:r>
+              <a:rPr lang="en-US" dirty="0"/>
+              <a:t>…</a:t>
+            </a:r>
+          </a:p>
+        </p:txBody>
+      </p:sp>
+      <p:sp>
+        <p:nvSpPr>
+          <p:cNvPr id="5" name="Rectangle 4"/>
+          <p:cNvSpPr/>
+          <p:nvPr/>
+        </p:nvSpPr>
+        <p:spPr>
+          <a:xfrm>
+            <a:off x="533400" y="381000"/>
+            <a:ext cx="7848600" cy="369332"/>
+          </a:xfrm>
+          <a:prstGeom prst="rect">
+            <a:avLst/>
+          </a:prstGeom>
+        </p:spPr>
+        <p:txBody>
+          <a:bodyPr wrap="square">
+            <a:spAutoFit/>
+          </a:bodyPr>
+          <a:lstStyle/>
+          <a:p>
+            <a:r>
+              <a:rPr lang="en-US" dirty="0"/>
+              <a:t>http://afodor.github.io/classes/stats2015/longitdunalRNASeqData.zip</a:t>
+            </a:r>
+          </a:p>
+        </p:txBody>
+      </p:sp>
+      <p:pic>
+        <p:nvPicPr>
+          <p:cNvPr id="1026" name="Picture 2"/>
+          <p:cNvPicPr>
+            <a:picLocks noChangeAspect="1" noChangeArrowheads="1"/>
+          </p:cNvPicPr>
+          <p:nvPr/>
+        </p:nvPicPr>
+        <p:blipFill>
+          <a:blip r:embed="rId2" cstate="print"/>
+          <a:srcRect/>
+          <a:stretch>
+            <a:fillRect/>
+          </a:stretch>
+        </p:blipFill>
+        <p:spPr bwMode="auto">
+          <a:xfrm>
+            <a:off x="381000" y="762000"/>
+            <a:ext cx="8553450" cy="5572125"/>
+          </a:xfrm>
+          <a:prstGeom prst="rect">
+            <a:avLst/>
+          </a:prstGeom>
+          <a:noFill/>
+          <a:ln w="9525">
+            <a:noFill/>
+            <a:miter lim="800000"/>
+            <a:headEnd/>
+            <a:tailEnd/>
+          </a:ln>
+        </p:spPr>
+      </p:pic>
+      <p:sp>
+        <p:nvSpPr>
+          <p:cNvPr id="7" name="TextBox 6"/>
+          <p:cNvSpPr txBox="1"/>
+          <p:nvPr/>
+        </p:nvSpPr>
+        <p:spPr>
+          <a:xfrm>
+            <a:off x="4047984" y="6400800"/>
+            <a:ext cx="3343416" cy="369332"/>
+          </a:xfrm>
+          <a:prstGeom prst="rect">
+            <a:avLst/>
+          </a:prstGeom>
+          <a:noFill/>
+        </p:spPr>
+        <p:txBody>
+          <a:bodyPr wrap="none" rtlCol="0">
+            <a:spAutoFit/>
+          </a:bodyPr>
+          <a:lstStyle/>
+          <a:p>
+            <a:r>
+              <a:rPr lang="en-US" dirty="0"/>
+              <a:t>File = nc101_scaff_dataCounts.txt</a:t>
+            </a:r>
+          </a:p>
+        </p:txBody>
+      </p:sp>
+    </p:spTree>
+  </p:cSld>
+  <p:clrMapOvr>
+    <a:masterClrMapping/>
+  </p:clrMapOvr>
+</p:sld>
+</file>
+
+<file path=ppt/slides/slide32.xml><?xml version="1.0" encoding="utf-8"?>
+<p:sld xmlns:a="http://schemas.openxmlformats.org/drawingml/2006/main" xmlns:r="http://schemas.openxmlformats.org/officeDocument/2006/relationships" xmlns:p="http://schemas.openxmlformats.org/presentationml/2006/main">
+  <p:cSld>
+    <p:spTree>
+      <p:nvGrpSpPr>
+        <p:cNvPr id="1" name=""/>
+        <p:cNvGrpSpPr/>
+        <p:nvPr/>
+      </p:nvGrpSpPr>
+      <p:grpSpPr>
+        <a:xfrm>
+          <a:off x="0" y="0"/>
+          <a:ext cx="0" cy="0"/>
+          <a:chOff x="0" y="0"/>
+          <a:chExt cx="0" cy="0"/>
+        </a:xfrm>
+      </p:grpSpPr>
+      <p:sp>
+        <p:nvSpPr>
+          <p:cNvPr id="4" name="TextBox 3"/>
+          <p:cNvSpPr txBox="1"/>
+          <p:nvPr/>
+        </p:nvSpPr>
+        <p:spPr>
+          <a:xfrm>
+            <a:off x="0" y="-76200"/>
+            <a:ext cx="2547236" cy="369332"/>
+          </a:xfrm>
+          <a:prstGeom prst="rect">
+            <a:avLst/>
+          </a:prstGeom>
+          <a:noFill/>
+        </p:spPr>
+        <p:txBody>
+          <a:bodyPr wrap="none" rtlCol="0">
+            <a:spAutoFit/>
+          </a:bodyPr>
+          <a:lstStyle/>
+          <a:p>
+            <a:r>
+              <a:rPr lang="en-US" dirty="0"/>
+              <a:t>The dataset is at </a:t>
+            </a:r>
+            <a:r>
+              <a:rPr lang="en-US" dirty="0" err="1"/>
+              <a:t>github</a:t>
+            </a:r>
+            <a:r>
+              <a:rPr lang="en-US" dirty="0"/>
+              <a:t>…</a:t>
+            </a:r>
+          </a:p>
+        </p:txBody>
+      </p:sp>
+      <p:pic>
+        <p:nvPicPr>
+          <p:cNvPr id="6" name="Picture 2"/>
+          <p:cNvPicPr>
+            <a:picLocks noChangeAspect="1" noChangeArrowheads="1"/>
+          </p:cNvPicPr>
+          <p:nvPr/>
+        </p:nvPicPr>
+        <p:blipFill>
+          <a:blip r:embed="rId2" cstate="print"/>
+          <a:srcRect/>
+          <a:stretch>
+            <a:fillRect/>
+          </a:stretch>
+        </p:blipFill>
+        <p:spPr bwMode="auto">
+          <a:xfrm>
+            <a:off x="381000" y="762000"/>
+            <a:ext cx="8553450" cy="5572125"/>
+          </a:xfrm>
+          <a:prstGeom prst="rect">
+            <a:avLst/>
+          </a:prstGeom>
+          <a:noFill/>
+          <a:ln w="9525">
+            <a:noFill/>
+            <a:miter lim="800000"/>
+            <a:headEnd/>
+            <a:tailEnd/>
+          </a:ln>
+        </p:spPr>
+      </p:pic>
+      <p:sp>
+        <p:nvSpPr>
+          <p:cNvPr id="7" name="TextBox 6"/>
+          <p:cNvSpPr txBox="1"/>
+          <p:nvPr/>
+        </p:nvSpPr>
+        <p:spPr>
+          <a:xfrm>
+            <a:off x="4047984" y="6400800"/>
+            <a:ext cx="3343416" cy="369332"/>
+          </a:xfrm>
+          <a:prstGeom prst="rect">
+            <a:avLst/>
+          </a:prstGeom>
+          <a:noFill/>
+        </p:spPr>
+        <p:txBody>
+          <a:bodyPr wrap="none" rtlCol="0">
+            <a:spAutoFit/>
+          </a:bodyPr>
+          <a:lstStyle/>
+          <a:p>
+            <a:r>
+              <a:rPr lang="en-US" dirty="0"/>
+              <a:t>File = nc101_scaff_dataCounts.txt</a:t>
+            </a:r>
+          </a:p>
+        </p:txBody>
+      </p:sp>
+      <p:cxnSp>
+        <p:nvCxnSpPr>
+          <p:cNvPr id="9" name="Straight Arrow Connector 8"/>
+          <p:cNvCxnSpPr/>
+          <p:nvPr/>
+        </p:nvCxnSpPr>
+        <p:spPr>
+          <a:xfrm flipH="1">
+            <a:off x="3352800" y="457200"/>
+            <a:ext cx="228600" cy="228600"/>
+          </a:xfrm>
+          <a:prstGeom prst="straightConnector1">
+            <a:avLst/>
+          </a:prstGeom>
+          <a:ln>
+            <a:tailEnd type="arrow"/>
+          </a:ln>
+        </p:spPr>
+        <p:style>
+          <a:lnRef idx="1">
+            <a:schemeClr val="accent1"/>
+          </a:lnRef>
+          <a:fillRef idx="0">
+            <a:schemeClr val="accent1"/>
+          </a:fillRef>
+          <a:effectRef idx="0">
+            <a:schemeClr val="accent1"/>
+          </a:effectRef>
+          <a:fontRef idx="minor">
+            <a:schemeClr val="tx1"/>
+          </a:fontRef>
+        </p:style>
+      </p:cxnSp>
+      <p:cxnSp>
+        <p:nvCxnSpPr>
+          <p:cNvPr id="11" name="Straight Arrow Connector 10"/>
+          <p:cNvCxnSpPr/>
+          <p:nvPr/>
+        </p:nvCxnSpPr>
+        <p:spPr>
+          <a:xfrm flipH="1">
+            <a:off x="2667000" y="457200"/>
+            <a:ext cx="228600" cy="228600"/>
+          </a:xfrm>
+          <a:prstGeom prst="straightConnector1">
+            <a:avLst/>
+          </a:prstGeom>
+          <a:ln>
+            <a:tailEnd type="arrow"/>
+          </a:ln>
+        </p:spPr>
+        <p:style>
+          <a:lnRef idx="1">
+            <a:schemeClr val="accent1"/>
+          </a:lnRef>
+          <a:fillRef idx="0">
+            <a:schemeClr val="accent1"/>
+          </a:fillRef>
+          <a:effectRef idx="0">
+            <a:schemeClr val="accent1"/>
+          </a:effectRef>
+          <a:fontRef idx="minor">
+            <a:schemeClr val="tx1"/>
+          </a:fontRef>
+        </p:style>
+      </p:cxnSp>
+      <p:cxnSp>
+        <p:nvCxnSpPr>
+          <p:cNvPr id="13" name="Straight Arrow Connector 12"/>
+          <p:cNvCxnSpPr/>
+          <p:nvPr/>
+        </p:nvCxnSpPr>
+        <p:spPr>
+          <a:xfrm flipH="1">
+            <a:off x="2057400" y="457200"/>
+            <a:ext cx="228600" cy="228600"/>
+          </a:xfrm>
+          <a:prstGeom prst="straightConnector1">
+            <a:avLst/>
+          </a:prstGeom>
+          <a:ln>
+            <a:tailEnd type="arrow"/>
+          </a:ln>
+        </p:spPr>
+        <p:style>
+          <a:lnRef idx="1">
+            <a:schemeClr val="accent1"/>
+          </a:lnRef>
+          <a:fillRef idx="0">
+            <a:schemeClr val="accent1"/>
+          </a:fillRef>
+          <a:effectRef idx="0">
+            <a:schemeClr val="accent1"/>
+          </a:effectRef>
+          <a:fontRef idx="minor">
+            <a:schemeClr val="tx1"/>
+          </a:fontRef>
+        </p:style>
+      </p:cxnSp>
+      <p:sp>
+        <p:nvSpPr>
+          <p:cNvPr id="14" name="TextBox 13"/>
+          <p:cNvSpPr txBox="1"/>
+          <p:nvPr/>
+        </p:nvSpPr>
+        <p:spPr>
+          <a:xfrm>
+            <a:off x="2590800" y="11668"/>
+            <a:ext cx="886333" cy="369332"/>
+          </a:xfrm>
+          <a:prstGeom prst="rect">
+            <a:avLst/>
+          </a:prstGeom>
+          <a:noFill/>
+        </p:spPr>
+        <p:txBody>
+          <a:bodyPr wrap="none" rtlCol="0">
+            <a:spAutoFit/>
+          </a:bodyPr>
+          <a:lstStyle/>
+          <a:p>
+            <a:r>
+              <a:rPr lang="en-US" dirty="0"/>
+              <a:t>Week 2</a:t>
+            </a:r>
+          </a:p>
+        </p:txBody>
+      </p:sp>
+      <p:cxnSp>
+        <p:nvCxnSpPr>
+          <p:cNvPr id="16" name="Straight Arrow Connector 15"/>
+          <p:cNvCxnSpPr/>
+          <p:nvPr/>
+        </p:nvCxnSpPr>
+        <p:spPr>
+          <a:xfrm flipH="1">
+            <a:off x="3962400" y="381000"/>
+            <a:ext cx="381000" cy="304800"/>
+          </a:xfrm>
+          <a:prstGeom prst="straightConnector1">
+            <a:avLst/>
+          </a:prstGeom>
+          <a:ln>
+            <a:tailEnd type="arrow"/>
+          </a:ln>
+        </p:spPr>
+        <p:style>
+          <a:lnRef idx="1">
+            <a:schemeClr val="accent1"/>
+          </a:lnRef>
+          <a:fillRef idx="0">
+            <a:schemeClr val="accent1"/>
+          </a:fillRef>
+          <a:effectRef idx="0">
+            <a:schemeClr val="accent1"/>
+          </a:effectRef>
+          <a:fontRef idx="minor">
+            <a:schemeClr val="tx1"/>
+          </a:fontRef>
+        </p:style>
+      </p:cxnSp>
+      <p:cxnSp>
+        <p:nvCxnSpPr>
+          <p:cNvPr id="18" name="Straight Arrow Connector 17"/>
+          <p:cNvCxnSpPr/>
+          <p:nvPr/>
+        </p:nvCxnSpPr>
+        <p:spPr>
+          <a:xfrm flipH="1">
+            <a:off x="4572000" y="381000"/>
+            <a:ext cx="304800" cy="304800"/>
+          </a:xfrm>
+          <a:prstGeom prst="straightConnector1">
+            <a:avLst/>
+          </a:prstGeom>
+          <a:ln>
+            <a:tailEnd type="arrow"/>
+          </a:ln>
+        </p:spPr>
+        <p:style>
+          <a:lnRef idx="1">
+            <a:schemeClr val="accent1"/>
+          </a:lnRef>
+          <a:fillRef idx="0">
+            <a:schemeClr val="accent1"/>
+          </a:fillRef>
+          <a:effectRef idx="0">
+            <a:schemeClr val="accent1"/>
+          </a:effectRef>
+          <a:fontRef idx="minor">
+            <a:schemeClr val="tx1"/>
+          </a:fontRef>
+        </p:style>
+      </p:cxnSp>
+      <p:cxnSp>
+        <p:nvCxnSpPr>
+          <p:cNvPr id="20" name="Straight Arrow Connector 19"/>
+          <p:cNvCxnSpPr/>
+          <p:nvPr/>
+        </p:nvCxnSpPr>
+        <p:spPr>
+          <a:xfrm flipH="1">
+            <a:off x="5105400" y="381000"/>
+            <a:ext cx="304800" cy="304800"/>
+          </a:xfrm>
+          <a:prstGeom prst="straightConnector1">
+            <a:avLst/>
+          </a:prstGeom>
+          <a:ln>
+            <a:tailEnd type="arrow"/>
+          </a:ln>
+        </p:spPr>
+        <p:style>
+          <a:lnRef idx="1">
+            <a:schemeClr val="accent1"/>
+          </a:lnRef>
+          <a:fillRef idx="0">
+            <a:schemeClr val="accent1"/>
+          </a:fillRef>
+          <a:effectRef idx="0">
+            <a:schemeClr val="accent1"/>
+          </a:effectRef>
+          <a:fontRef idx="minor">
+            <a:schemeClr val="tx1"/>
+          </a:fontRef>
+        </p:style>
+      </p:cxnSp>
+      <p:sp>
+        <p:nvSpPr>
+          <p:cNvPr id="21" name="TextBox 20"/>
+          <p:cNvSpPr txBox="1"/>
+          <p:nvPr/>
+        </p:nvSpPr>
+        <p:spPr>
+          <a:xfrm>
+            <a:off x="4371467" y="0"/>
+            <a:ext cx="1003352" cy="369332"/>
+          </a:xfrm>
+          <a:prstGeom prst="rect">
+            <a:avLst/>
+          </a:prstGeom>
+          <a:noFill/>
+        </p:spPr>
+        <p:txBody>
+          <a:bodyPr wrap="none" rtlCol="0">
+            <a:spAutoFit/>
+          </a:bodyPr>
+          <a:lstStyle/>
+          <a:p>
+            <a:r>
+              <a:rPr lang="en-US" dirty="0"/>
+              <a:t>Week 12</a:t>
+            </a:r>
+          </a:p>
+        </p:txBody>
+      </p:sp>
+      <p:cxnSp>
+        <p:nvCxnSpPr>
+          <p:cNvPr id="22" name="Straight Arrow Connector 21"/>
+          <p:cNvCxnSpPr/>
+          <p:nvPr/>
+        </p:nvCxnSpPr>
+        <p:spPr>
+          <a:xfrm flipH="1">
+            <a:off x="5791200" y="381000"/>
+            <a:ext cx="381000" cy="304800"/>
+          </a:xfrm>
+          <a:prstGeom prst="straightConnector1">
+            <a:avLst/>
+          </a:prstGeom>
+          <a:ln>
+            <a:tailEnd type="arrow"/>
+          </a:ln>
+        </p:spPr>
+        <p:style>
+          <a:lnRef idx="1">
+            <a:schemeClr val="accent1"/>
+          </a:lnRef>
+          <a:fillRef idx="0">
+            <a:schemeClr val="accent1"/>
+          </a:fillRef>
+          <a:effectRef idx="0">
+            <a:schemeClr val="accent1"/>
+          </a:effectRef>
+          <a:fontRef idx="minor">
+            <a:schemeClr val="tx1"/>
+          </a:fontRef>
+        </p:style>
+      </p:cxnSp>
+      <p:cxnSp>
+        <p:nvCxnSpPr>
+          <p:cNvPr id="23" name="Straight Arrow Connector 22"/>
+          <p:cNvCxnSpPr/>
+          <p:nvPr/>
+        </p:nvCxnSpPr>
+        <p:spPr>
+          <a:xfrm flipH="1">
+            <a:off x="6400800" y="381000"/>
+            <a:ext cx="304800" cy="304800"/>
+          </a:xfrm>
+          <a:prstGeom prst="straightConnector1">
+            <a:avLst/>
+          </a:prstGeom>
+          <a:ln>
+            <a:tailEnd type="arrow"/>
+          </a:ln>
+        </p:spPr>
+        <p:style>
+          <a:lnRef idx="1">
+            <a:schemeClr val="accent1"/>
+          </a:lnRef>
+          <a:fillRef idx="0">
+            <a:schemeClr val="accent1"/>
+          </a:fillRef>
+          <a:effectRef idx="0">
+            <a:schemeClr val="accent1"/>
+          </a:effectRef>
+          <a:fontRef idx="minor">
+            <a:schemeClr val="tx1"/>
+          </a:fontRef>
+        </p:style>
+      </p:cxnSp>
+      <p:cxnSp>
+        <p:nvCxnSpPr>
+          <p:cNvPr id="24" name="Straight Arrow Connector 23"/>
+          <p:cNvCxnSpPr/>
+          <p:nvPr/>
+        </p:nvCxnSpPr>
+        <p:spPr>
+          <a:xfrm flipH="1">
+            <a:off x="6934200" y="381000"/>
+            <a:ext cx="304800" cy="304800"/>
+          </a:xfrm>
+          <a:prstGeom prst="straightConnector1">
+            <a:avLst/>
+          </a:prstGeom>
+          <a:ln>
+            <a:tailEnd type="arrow"/>
+          </a:ln>
+        </p:spPr>
+        <p:style>
+          <a:lnRef idx="1">
+            <a:schemeClr val="accent1"/>
+          </a:lnRef>
+          <a:fillRef idx="0">
+            <a:schemeClr val="accent1"/>
+          </a:fillRef>
+          <a:effectRef idx="0">
+            <a:schemeClr val="accent1"/>
+          </a:effectRef>
+          <a:fontRef idx="minor">
+            <a:schemeClr val="tx1"/>
+          </a:fontRef>
+        </p:style>
+      </p:cxnSp>
+      <p:cxnSp>
+        <p:nvCxnSpPr>
+          <p:cNvPr id="25" name="Straight Arrow Connector 24"/>
+          <p:cNvCxnSpPr/>
+          <p:nvPr/>
+        </p:nvCxnSpPr>
+        <p:spPr>
+          <a:xfrm flipH="1">
+            <a:off x="7543800" y="381000"/>
+            <a:ext cx="304800" cy="304800"/>
+          </a:xfrm>
+          <a:prstGeom prst="straightConnector1">
+            <a:avLst/>
+          </a:prstGeom>
+          <a:ln>
+            <a:tailEnd type="arrow"/>
+          </a:ln>
+        </p:spPr>
+        <p:style>
+          <a:lnRef idx="1">
+            <a:schemeClr val="accent1"/>
+          </a:lnRef>
+          <a:fillRef idx="0">
+            <a:schemeClr val="accent1"/>
+          </a:fillRef>
+          <a:effectRef idx="0">
+            <a:schemeClr val="accent1"/>
+          </a:effectRef>
+          <a:fontRef idx="minor">
+            <a:schemeClr val="tx1"/>
+          </a:fontRef>
+        </p:style>
+      </p:cxnSp>
+      <p:cxnSp>
+        <p:nvCxnSpPr>
+          <p:cNvPr id="26" name="Straight Arrow Connector 25"/>
+          <p:cNvCxnSpPr/>
+          <p:nvPr/>
+        </p:nvCxnSpPr>
+        <p:spPr>
+          <a:xfrm flipH="1">
+            <a:off x="8077200" y="381000"/>
+            <a:ext cx="304800" cy="304800"/>
+          </a:xfrm>
+          <a:prstGeom prst="straightConnector1">
+            <a:avLst/>
+          </a:prstGeom>
+          <a:ln>
+            <a:tailEnd type="arrow"/>
+          </a:ln>
+        </p:spPr>
+        <p:style>
+          <a:lnRef idx="1">
+            <a:schemeClr val="accent1"/>
+          </a:lnRef>
+          <a:fillRef idx="0">
+            <a:schemeClr val="accent1"/>
+          </a:fillRef>
+          <a:effectRef idx="0">
+            <a:schemeClr val="accent1"/>
+          </a:effectRef>
+          <a:fontRef idx="minor">
+            <a:schemeClr val="tx1"/>
+          </a:fontRef>
+        </p:style>
+      </p:cxnSp>
+      <p:sp>
+        <p:nvSpPr>
+          <p:cNvPr id="27" name="TextBox 26"/>
+          <p:cNvSpPr txBox="1"/>
+          <p:nvPr/>
+        </p:nvSpPr>
+        <p:spPr>
+          <a:xfrm>
+            <a:off x="6921448" y="0"/>
+            <a:ext cx="1003352" cy="369332"/>
+          </a:xfrm>
+          <a:prstGeom prst="rect">
+            <a:avLst/>
+          </a:prstGeom>
+          <a:noFill/>
+        </p:spPr>
+        <p:txBody>
+          <a:bodyPr wrap="none" rtlCol="0">
+            <a:spAutoFit/>
+          </a:bodyPr>
+          <a:lstStyle/>
+          <a:p>
+            <a:r>
+              <a:rPr lang="en-US" dirty="0"/>
+              <a:t>Week 20</a:t>
+            </a:r>
+          </a:p>
+        </p:txBody>
+      </p:sp>
+    </p:spTree>
+  </p:cSld>
+  <p:clrMapOvr>
+    <a:masterClrMapping/>
+  </p:clrMapOvr>
+</p:sld>
+</file>
+
+<file path=ppt/slides/slide33.xml><?xml version="1.0" encoding="utf-8"?>
+<p:sld xmlns:a="http://schemas.openxmlformats.org/drawingml/2006/main" xmlns:r="http://schemas.openxmlformats.org/officeDocument/2006/relationships" xmlns:p="http://schemas.openxmlformats.org/presentationml/2006/main">
+  <p:cSld>
+    <p:spTree>
+      <p:nvGrpSpPr>
+        <p:cNvPr id="1" name=""/>
+        <p:cNvGrpSpPr/>
+        <p:nvPr/>
+      </p:nvGrpSpPr>
+      <p:grpSpPr>
+        <a:xfrm>
+          <a:off x="0" y="0"/>
+          <a:ext cx="0" cy="0"/>
+          <a:chOff x="0" y="0"/>
+          <a:chExt cx="0" cy="0"/>
+        </a:xfrm>
+      </p:grpSpPr>
+      <p:sp>
+        <p:nvSpPr>
+          <p:cNvPr id="4" name="TextBox 3"/>
+          <p:cNvSpPr txBox="1"/>
+          <p:nvPr/>
+        </p:nvSpPr>
+        <p:spPr>
+          <a:xfrm>
+            <a:off x="685800" y="-76200"/>
+            <a:ext cx="3907865" cy="369332"/>
+          </a:xfrm>
+          <a:prstGeom prst="rect">
+            <a:avLst/>
+          </a:prstGeom>
+          <a:noFill/>
+        </p:spPr>
+        <p:txBody>
+          <a:bodyPr wrap="none" rtlCol="0">
+            <a:spAutoFit/>
+          </a:bodyPr>
+          <a:lstStyle/>
+          <a:p>
+            <a:r>
+              <a:rPr lang="en-US" dirty="0"/>
+              <a:t>In case you care what these genes are…</a:t>
+            </a:r>
+          </a:p>
+        </p:txBody>
+      </p:sp>
+      <p:pic>
+        <p:nvPicPr>
+          <p:cNvPr id="2050" name="Picture 2"/>
+          <p:cNvPicPr>
+            <a:picLocks noChangeAspect="1" noChangeArrowheads="1"/>
+          </p:cNvPicPr>
+          <p:nvPr/>
+        </p:nvPicPr>
+        <p:blipFill>
+          <a:blip r:embed="rId2" cstate="print"/>
+          <a:srcRect/>
+          <a:stretch>
+            <a:fillRect/>
+          </a:stretch>
+        </p:blipFill>
+        <p:spPr bwMode="auto">
+          <a:xfrm>
+            <a:off x="1138238" y="228600"/>
+            <a:ext cx="7015162" cy="5746177"/>
+          </a:xfrm>
+          <a:prstGeom prst="rect">
+            <a:avLst/>
+          </a:prstGeom>
+          <a:noFill/>
+          <a:ln w="9525">
+            <a:noFill/>
+            <a:miter lim="800000"/>
+            <a:headEnd/>
+            <a:tailEnd/>
+          </a:ln>
+        </p:spPr>
+      </p:pic>
+      <p:sp>
+        <p:nvSpPr>
+          <p:cNvPr id="7" name="TextBox 6"/>
+          <p:cNvSpPr txBox="1"/>
+          <p:nvPr/>
+        </p:nvSpPr>
+        <p:spPr>
+          <a:xfrm>
+            <a:off x="4047984" y="6336268"/>
+            <a:ext cx="2870145" cy="369332"/>
+          </a:xfrm>
+          <a:prstGeom prst="rect">
+            <a:avLst/>
+          </a:prstGeom>
+          <a:noFill/>
+        </p:spPr>
+        <p:txBody>
+          <a:bodyPr wrap="none" rtlCol="0">
+            <a:spAutoFit/>
+          </a:bodyPr>
+          <a:lstStyle/>
+          <a:p>
+            <a:r>
+              <a:rPr lang="en-US" dirty="0"/>
+              <a:t>File = nc101_Annotations.txt</a:t>
+            </a:r>
+          </a:p>
+        </p:txBody>
+      </p:sp>
+    </p:spTree>
+  </p:cSld>
+  <p:clrMapOvr>
+    <a:masterClrMapping/>
+  </p:clrMapOvr>
+</p:sld>
+</file>
+
+<file path=ppt/slides/slide34.xml><?xml version="1.0" encoding="utf-8"?>
+<p:sld xmlns:a="http://schemas.openxmlformats.org/drawingml/2006/main" xmlns:r="http://schemas.openxmlformats.org/officeDocument/2006/relationships" xmlns:p="http://schemas.openxmlformats.org/presentationml/2006/main">
+  <p:cSld>
+    <p:spTree>
+      <p:nvGrpSpPr>
+        <p:cNvPr id="1" name=""/>
+        <p:cNvGrpSpPr/>
+        <p:nvPr/>
+      </p:nvGrpSpPr>
+      <p:grpSpPr>
+        <a:xfrm>
+          <a:off x="0" y="0"/>
+          <a:ext cx="0" cy="0"/>
+          <a:chOff x="0" y="0"/>
+          <a:chExt cx="0" cy="0"/>
+        </a:xfrm>
+      </p:grpSpPr>
+      <p:pic>
+        <p:nvPicPr>
+          <p:cNvPr id="1026" name="Picture 2"/>
+          <p:cNvPicPr>
+            <a:picLocks noChangeAspect="1" noChangeArrowheads="1"/>
+          </p:cNvPicPr>
+          <p:nvPr/>
+        </p:nvPicPr>
+        <p:blipFill>
+          <a:blip r:embed="rId3" cstate="print"/>
+          <a:srcRect/>
+          <a:stretch>
+            <a:fillRect/>
+          </a:stretch>
+        </p:blipFill>
+        <p:spPr bwMode="auto">
+          <a:xfrm>
+            <a:off x="1066801" y="457200"/>
+            <a:ext cx="6477000" cy="2978141"/>
+          </a:xfrm>
+          <a:prstGeom prst="rect">
+            <a:avLst/>
+          </a:prstGeom>
+          <a:noFill/>
+          <a:ln w="9525">
+            <a:noFill/>
+            <a:miter lim="800000"/>
+            <a:headEnd/>
+            <a:tailEnd/>
+          </a:ln>
+        </p:spPr>
+      </p:pic>
+      <p:sp>
+        <p:nvSpPr>
+          <p:cNvPr id="8" name="Rectangle 7"/>
+          <p:cNvSpPr/>
+          <p:nvPr/>
+        </p:nvSpPr>
+        <p:spPr>
+          <a:xfrm>
+            <a:off x="2514600" y="3352800"/>
+            <a:ext cx="7239000" cy="369332"/>
+          </a:xfrm>
+          <a:prstGeom prst="rect">
+            <a:avLst/>
+          </a:prstGeom>
+        </p:spPr>
+        <p:txBody>
+          <a:bodyPr wrap="square">
+            <a:spAutoFit/>
+          </a:bodyPr>
+          <a:lstStyle/>
+          <a:p>
+            <a:r>
+              <a:rPr lang="en-US" dirty="0"/>
+              <a:t>http://www.sciencemag.org/content/338/6103/120.full.pdf</a:t>
+            </a:r>
+          </a:p>
+        </p:txBody>
+      </p:sp>
+      <p:sp>
+        <p:nvSpPr>
+          <p:cNvPr id="4" name="TextBox 3"/>
+          <p:cNvSpPr txBox="1"/>
+          <p:nvPr/>
+        </p:nvSpPr>
+        <p:spPr>
+          <a:xfrm>
+            <a:off x="381000" y="76200"/>
+            <a:ext cx="5106719" cy="369332"/>
+          </a:xfrm>
+          <a:prstGeom prst="rect">
+            <a:avLst/>
+          </a:prstGeom>
+          <a:noFill/>
+        </p:spPr>
+        <p:txBody>
+          <a:bodyPr wrap="none" rtlCol="0">
+            <a:spAutoFit/>
+          </a:bodyPr>
+          <a:lstStyle/>
+          <a:p>
+            <a:r>
+              <a:rPr lang="en-US" dirty="0"/>
+              <a:t>Two papers that describe this </a:t>
+            </a:r>
+            <a:r>
+              <a:rPr lang="en-US"/>
+              <a:t>experimental system….</a:t>
+            </a:r>
+          </a:p>
+        </p:txBody>
+      </p:sp>
+      <p:cxnSp>
+        <p:nvCxnSpPr>
+          <p:cNvPr id="6" name="Straight Connector 5"/>
+          <p:cNvCxnSpPr/>
+          <p:nvPr/>
+        </p:nvCxnSpPr>
+        <p:spPr>
+          <a:xfrm>
+            <a:off x="533400" y="3810000"/>
+            <a:ext cx="8077200" cy="0"/>
+          </a:xfrm>
+          <a:prstGeom prst="line">
+            <a:avLst/>
+          </a:prstGeom>
+        </p:spPr>
+        <p:style>
+          <a:lnRef idx="1">
+            <a:schemeClr val="accent1"/>
+          </a:lnRef>
+          <a:fillRef idx="0">
+            <a:schemeClr val="accent1"/>
+          </a:fillRef>
+          <a:effectRef idx="0">
+            <a:schemeClr val="accent1"/>
+          </a:effectRef>
+          <a:fontRef idx="minor">
+            <a:schemeClr val="tx1"/>
+          </a:fontRef>
+        </p:style>
+      </p:cxnSp>
+      <p:pic>
+        <p:nvPicPr>
+          <p:cNvPr id="3074" name="Picture 2"/>
+          <p:cNvPicPr>
+            <a:picLocks noChangeAspect="1" noChangeArrowheads="1"/>
+          </p:cNvPicPr>
+          <p:nvPr/>
+        </p:nvPicPr>
+        <p:blipFill>
+          <a:blip r:embed="rId4" cstate="print"/>
+          <a:srcRect/>
+          <a:stretch>
+            <a:fillRect/>
+          </a:stretch>
+        </p:blipFill>
+        <p:spPr bwMode="auto">
+          <a:xfrm>
+            <a:off x="1066800" y="3886200"/>
+            <a:ext cx="6162675" cy="2028825"/>
+          </a:xfrm>
+          <a:prstGeom prst="rect">
+            <a:avLst/>
+          </a:prstGeom>
+          <a:noFill/>
+          <a:ln w="9525">
+            <a:noFill/>
+            <a:miter lim="800000"/>
+            <a:headEnd/>
+            <a:tailEnd/>
+          </a:ln>
+        </p:spPr>
+      </p:pic>
+      <p:sp>
+        <p:nvSpPr>
+          <p:cNvPr id="9" name="TextBox 8"/>
+          <p:cNvSpPr txBox="1"/>
+          <p:nvPr/>
+        </p:nvSpPr>
+        <p:spPr>
+          <a:xfrm>
+            <a:off x="159938" y="6096000"/>
+            <a:ext cx="8984062" cy="923330"/>
+          </a:xfrm>
+          <a:prstGeom prst="rect">
+            <a:avLst/>
+          </a:prstGeom>
+          <a:noFill/>
+        </p:spPr>
+        <p:txBody>
+          <a:bodyPr wrap="none" rtlCol="0">
+            <a:spAutoFit/>
+          </a:bodyPr>
+          <a:lstStyle/>
+          <a:p>
+            <a:r>
+              <a:rPr lang="en-US" dirty="0"/>
+              <a:t>Proofs are here: </a:t>
+            </a:r>
+            <a:r>
+              <a:rPr lang="en-US" dirty="0">
+                <a:hlinkClick r:id="rId5"/>
+              </a:rPr>
+              <a:t>http://afodor.github.io/classes/stats2015/proofs_NatureCommunications.pdf</a:t>
+            </a:r>
+            <a:endParaRPr lang="en-US" dirty="0"/>
+          </a:p>
+          <a:p>
+            <a:r>
+              <a:rPr lang="en-US" dirty="0"/>
+              <a:t>(since UNCC doesn’t have access to this journal!!)</a:t>
+            </a:r>
+          </a:p>
+          <a:p>
+            <a:r>
+              <a:rPr lang="en-US" dirty="0"/>
+              <a:t> </a:t>
+            </a:r>
+          </a:p>
+        </p:txBody>
+      </p:sp>
+    </p:spTree>
+  </p:cSld>
+  <p:clrMapOvr>
+    <a:masterClrMapping/>
+  </p:clrMapOvr>
+</p:sld>
+</file>
+
+<file path=ppt/slides/slide35.xml><?xml version="1.0" encoding="utf-8"?>
+<p:sld xmlns:a="http://schemas.openxmlformats.org/drawingml/2006/main" xmlns:r="http://schemas.openxmlformats.org/officeDocument/2006/relationships" xmlns:p="http://schemas.openxmlformats.org/presentationml/2006/main">
+  <p:cSld>
+    <p:spTree>
+      <p:nvGrpSpPr>
+        <p:cNvPr id="1" name=""/>
+        <p:cNvGrpSpPr/>
+        <p:nvPr/>
+      </p:nvGrpSpPr>
+      <p:grpSpPr>
+        <a:xfrm>
+          <a:off x="0" y="0"/>
+          <a:ext cx="0" cy="0"/>
+          <a:chOff x="0" y="0"/>
+          <a:chExt cx="0" cy="0"/>
+        </a:xfrm>
+      </p:grpSpPr>
+      <p:pic>
+        <p:nvPicPr>
+          <p:cNvPr id="4098" name="Picture 2"/>
+          <p:cNvPicPr>
+            <a:picLocks noChangeAspect="1" noChangeArrowheads="1"/>
+          </p:cNvPicPr>
+          <p:nvPr/>
+        </p:nvPicPr>
+        <p:blipFill>
+          <a:blip r:embed="rId2" cstate="print"/>
+          <a:srcRect/>
+          <a:stretch>
+            <a:fillRect/>
+          </a:stretch>
+        </p:blipFill>
+        <p:spPr bwMode="auto">
+          <a:xfrm>
+            <a:off x="214313" y="1238250"/>
+            <a:ext cx="8715375" cy="4381500"/>
+          </a:xfrm>
+          <a:prstGeom prst="rect">
+            <a:avLst/>
+          </a:prstGeom>
+          <a:noFill/>
+          <a:ln w="9525">
+            <a:noFill/>
+            <a:miter lim="800000"/>
+            <a:headEnd/>
+            <a:tailEnd/>
+          </a:ln>
+        </p:spPr>
+      </p:pic>
+      <p:sp>
+        <p:nvSpPr>
+          <p:cNvPr id="3" name="TextBox 2"/>
+          <p:cNvSpPr txBox="1"/>
+          <p:nvPr/>
+        </p:nvSpPr>
+        <p:spPr>
+          <a:xfrm>
+            <a:off x="457200" y="381000"/>
+            <a:ext cx="4536306" cy="369332"/>
+          </a:xfrm>
+          <a:prstGeom prst="rect">
+            <a:avLst/>
+          </a:prstGeom>
+          <a:noFill/>
+        </p:spPr>
+        <p:txBody>
+          <a:bodyPr wrap="none" rtlCol="0">
+            <a:spAutoFit/>
+          </a:bodyPr>
+          <a:lstStyle/>
+          <a:p>
+            <a:r>
+              <a:rPr lang="en-US" dirty="0"/>
+              <a:t>Fig.3 in the 2</a:t>
+            </a:r>
+            <a:r>
+              <a:rPr lang="en-US" baseline="30000" dirty="0"/>
+              <a:t>nd</a:t>
+            </a:r>
+            <a:r>
+              <a:rPr lang="en-US" dirty="0"/>
+              <a:t> paper is the </a:t>
+            </a:r>
+            <a:r>
+              <a:rPr lang="en-US"/>
+              <a:t>dataset you have…</a:t>
+            </a:r>
+          </a:p>
+        </p:txBody>
+      </p:sp>
+    </p:spTree>
+  </p:cSld>
+  <p:clrMapOvr>
+    <a:masterClrMapping/>
+  </p:clrMapOvr>
+</p:sld>
+</file>
+
+<file path=ppt/slides/slide36.xml><?xml version="1.0" encoding="utf-8"?>
+<p:sld xmlns:a="http://schemas.openxmlformats.org/drawingml/2006/main" xmlns:r="http://schemas.openxmlformats.org/officeDocument/2006/relationships" xmlns:p="http://schemas.openxmlformats.org/presentationml/2006/main">
+  <p:cSld>
+    <p:spTree>
+      <p:nvGrpSpPr>
+        <p:cNvPr id="1" name=""/>
+        <p:cNvGrpSpPr/>
+        <p:nvPr/>
+      </p:nvGrpSpPr>
+      <p:grpSpPr>
+        <a:xfrm>
+          <a:off x="0" y="0"/>
+          <a:ext cx="0" cy="0"/>
+          <a:chOff x="0" y="0"/>
+          <a:chExt cx="0" cy="0"/>
+        </a:xfrm>
+      </p:grpSpPr>
+      <p:pic>
+        <p:nvPicPr>
+          <p:cNvPr id="2" name="Picture 1" descr="Editorial-fig1final-32p.jpg"/>
+          <p:cNvPicPr>
+            <a:picLocks noChangeAspect="1"/>
+          </p:cNvPicPr>
+          <p:nvPr/>
+        </p:nvPicPr>
+        <p:blipFill>
+          <a:blip r:embed="rId3" cstate="print"/>
+          <a:stretch>
+            <a:fillRect/>
+          </a:stretch>
+        </p:blipFill>
+        <p:spPr>
+          <a:xfrm>
+            <a:off x="2459490" y="304800"/>
+            <a:ext cx="4703310" cy="6328410"/>
+          </a:xfrm>
+          <a:prstGeom prst="rect">
+            <a:avLst/>
+          </a:prstGeom>
+        </p:spPr>
+      </p:pic>
+      <p:sp>
+        <p:nvSpPr>
+          <p:cNvPr id="3" name="TextBox 2"/>
+          <p:cNvSpPr txBox="1"/>
+          <p:nvPr/>
+        </p:nvSpPr>
+        <p:spPr>
+          <a:xfrm>
+            <a:off x="5889456" y="6633210"/>
+            <a:ext cx="2873544" cy="276999"/>
+          </a:xfrm>
+          <a:prstGeom prst="rect">
+            <a:avLst/>
+          </a:prstGeom>
+          <a:noFill/>
+        </p:spPr>
+        <p:txBody>
+          <a:bodyPr wrap="none" rtlCol="0">
+            <a:spAutoFit/>
+          </a:bodyPr>
+          <a:lstStyle/>
+          <a:p>
+            <a:r>
+              <a:rPr lang="en-US" sz="1200" dirty="0">
+                <a:latin typeface="Arial" pitchFamily="34" charset="0"/>
+                <a:cs typeface="Arial" pitchFamily="34" charset="0"/>
+              </a:rPr>
+              <a:t>Fodor &amp; Talley. Gastroenterology.  2011</a:t>
+            </a:r>
+          </a:p>
+        </p:txBody>
+      </p:sp>
+      <p:sp>
+        <p:nvSpPr>
+          <p:cNvPr id="5" name="TextBox 4"/>
+          <p:cNvSpPr txBox="1"/>
+          <p:nvPr/>
+        </p:nvSpPr>
+        <p:spPr>
+          <a:xfrm>
+            <a:off x="154783" y="-49143"/>
+            <a:ext cx="8913017" cy="353943"/>
+          </a:xfrm>
+          <a:prstGeom prst="rect">
+            <a:avLst/>
+          </a:prstGeom>
+          <a:noFill/>
+        </p:spPr>
+        <p:txBody>
+          <a:bodyPr wrap="none" rtlCol="0">
+            <a:spAutoFit/>
+          </a:bodyPr>
+          <a:lstStyle/>
+          <a:p>
+            <a:r>
+              <a:rPr lang="en-US" sz="1700" dirty="0">
+                <a:solidFill>
+                  <a:srgbClr val="FF0000"/>
+                </a:solidFill>
+                <a:latin typeface="Arial" pitchFamily="34" charset="0"/>
+                <a:cs typeface="Arial" pitchFamily="34" charset="0"/>
+              </a:rPr>
+              <a:t>The “</a:t>
+            </a:r>
+            <a:r>
+              <a:rPr lang="en-US" sz="1700" dirty="0" err="1">
+                <a:solidFill>
+                  <a:srgbClr val="FF0000"/>
+                </a:solidFill>
+                <a:latin typeface="Arial" pitchFamily="34" charset="0"/>
+                <a:cs typeface="Arial" pitchFamily="34" charset="0"/>
+              </a:rPr>
+              <a:t>dysbiosis</a:t>
+            </a:r>
+            <a:r>
+              <a:rPr lang="en-US" sz="1700" dirty="0">
+                <a:solidFill>
+                  <a:srgbClr val="FF0000"/>
+                </a:solidFill>
+                <a:latin typeface="Arial" pitchFamily="34" charset="0"/>
+                <a:cs typeface="Arial" pitchFamily="34" charset="0"/>
+              </a:rPr>
+              <a:t>” hypothesis linking risk for inflammation related diseases to the </a:t>
+            </a:r>
+            <a:r>
+              <a:rPr lang="en-US" sz="1700" dirty="0" err="1">
+                <a:solidFill>
+                  <a:srgbClr val="FF0000"/>
+                </a:solidFill>
+                <a:latin typeface="Arial" pitchFamily="34" charset="0"/>
+                <a:cs typeface="Arial" pitchFamily="34" charset="0"/>
+              </a:rPr>
+              <a:t>microbiome</a:t>
+            </a:r>
+            <a:endParaRPr lang="en-US" sz="1700" dirty="0">
+              <a:solidFill>
+                <a:srgbClr val="FF0000"/>
+              </a:solidFill>
+              <a:latin typeface="Arial" pitchFamily="34" charset="0"/>
+              <a:cs typeface="Arial" pitchFamily="34" charset="0"/>
+            </a:endParaRPr>
+          </a:p>
+        </p:txBody>
+      </p:sp>
+      <p:sp>
+        <p:nvSpPr>
+          <p:cNvPr id="6" name="Rectangle 5"/>
+          <p:cNvSpPr/>
+          <p:nvPr/>
+        </p:nvSpPr>
+        <p:spPr>
+          <a:xfrm>
+            <a:off x="2667000" y="304800"/>
+            <a:ext cx="4267200" cy="228600"/>
+          </a:xfrm>
+          <a:prstGeom prst="rect">
+            <a:avLst/>
+          </a:prstGeom>
+          <a:solidFill>
+            <a:schemeClr val="bg1"/>
+          </a:solidFill>
+          <a:ln>
+            <a:noFill/>
+          </a:ln>
+        </p:spPr>
+        <p:style>
+          <a:lnRef idx="2">
+            <a:schemeClr val="accent1">
+              <a:shade val="50000"/>
+            </a:schemeClr>
+          </a:lnRef>
+          <a:fillRef idx="1">
+            <a:schemeClr val="accent1"/>
+          </a:fillRef>
+          <a:effectRef idx="0">
+            <a:schemeClr val="accent1"/>
+          </a:effectRef>
+          <a:fontRef idx="minor">
+            <a:schemeClr val="lt1"/>
+          </a:fontRef>
+        </p:style>
+        <p:txBody>
+          <a:bodyPr rtlCol="0" anchor="ctr"/>
+          <a:lstStyle/>
+          <a:p>
+            <a:pPr algn="ctr"/>
+            <a:endParaRPr lang="en-US"/>
+          </a:p>
+        </p:txBody>
+      </p:sp>
+    </p:spTree>
+  </p:cSld>
+  <p:clrMapOvr>
+    <a:masterClrMapping/>
+  </p:clrMapOvr>
+</p:sld>
+</file>
+
+<file path=ppt/slides/slide37.xml><?xml version="1.0" encoding="utf-8"?>
+<p:sld xmlns:a="http://schemas.openxmlformats.org/drawingml/2006/main" xmlns:r="http://schemas.openxmlformats.org/officeDocument/2006/relationships" xmlns:p="http://schemas.openxmlformats.org/presentationml/2006/main">
+  <p:cSld>
+    <p:spTree>
+      <p:nvGrpSpPr>
+        <p:cNvPr id="1" name=""/>
+        <p:cNvGrpSpPr/>
+        <p:nvPr/>
+      </p:nvGrpSpPr>
+      <p:grpSpPr>
+        <a:xfrm>
+          <a:off x="0" y="0"/>
+          <a:ext cx="0" cy="0"/>
+          <a:chOff x="0" y="0"/>
+          <a:chExt cx="0" cy="0"/>
+        </a:xfrm>
+      </p:grpSpPr>
+      <p:pic>
+        <p:nvPicPr>
+          <p:cNvPr id="1026" name="Picture 2"/>
+          <p:cNvPicPr>
+            <a:picLocks noChangeAspect="1" noChangeArrowheads="1"/>
+          </p:cNvPicPr>
+          <p:nvPr/>
+        </p:nvPicPr>
+        <p:blipFill>
+          <a:blip r:embed="rId2" cstate="print"/>
+          <a:srcRect/>
+          <a:stretch>
+            <a:fillRect/>
+          </a:stretch>
+        </p:blipFill>
+        <p:spPr bwMode="auto">
+          <a:xfrm>
+            <a:off x="1219200" y="926068"/>
+            <a:ext cx="7491845" cy="5029200"/>
+          </a:xfrm>
+          <a:prstGeom prst="rect">
+            <a:avLst/>
+          </a:prstGeom>
+          <a:noFill/>
+          <a:ln w="9525">
+            <a:noFill/>
+            <a:miter lim="800000"/>
+            <a:headEnd/>
+            <a:tailEnd/>
+          </a:ln>
+        </p:spPr>
+      </p:pic>
+      <p:sp>
+        <p:nvSpPr>
+          <p:cNvPr id="4" name="TextBox 3"/>
+          <p:cNvSpPr txBox="1"/>
+          <p:nvPr/>
+        </p:nvSpPr>
+        <p:spPr>
+          <a:xfrm>
+            <a:off x="5726721" y="6412468"/>
+            <a:ext cx="2722605" cy="369332"/>
+          </a:xfrm>
+          <a:prstGeom prst="rect">
+            <a:avLst/>
+          </a:prstGeom>
+          <a:noFill/>
+        </p:spPr>
+        <p:txBody>
+          <a:bodyPr wrap="none" rtlCol="0">
+            <a:spAutoFit/>
+          </a:bodyPr>
+          <a:lstStyle/>
+          <a:p>
+            <a:r>
+              <a:rPr lang="en-US" dirty="0"/>
+              <a:t>Arthur et al, Science, 2012</a:t>
+            </a:r>
+          </a:p>
+        </p:txBody>
+      </p:sp>
+      <p:sp>
+        <p:nvSpPr>
+          <p:cNvPr id="5" name="TextBox 4"/>
+          <p:cNvSpPr txBox="1"/>
+          <p:nvPr/>
+        </p:nvSpPr>
+        <p:spPr>
+          <a:xfrm>
+            <a:off x="228600" y="152400"/>
+            <a:ext cx="8752717" cy="400110"/>
+          </a:xfrm>
+          <a:prstGeom prst="rect">
+            <a:avLst/>
+          </a:prstGeom>
+          <a:noFill/>
+        </p:spPr>
+        <p:txBody>
+          <a:bodyPr wrap="none" rtlCol="0">
+            <a:spAutoFit/>
+          </a:bodyPr>
+          <a:lstStyle/>
+          <a:p>
+            <a:r>
+              <a:rPr lang="en-US" sz="2000" dirty="0">
+                <a:solidFill>
+                  <a:srgbClr val="FF0000"/>
+                </a:solidFill>
+                <a:latin typeface="Arial" pitchFamily="34" charset="0"/>
+                <a:cs typeface="Arial" pitchFamily="34" charset="0"/>
+              </a:rPr>
+              <a:t>Some bugs, but not others, can cause inflammation to progress to cancer…</a:t>
+            </a:r>
+          </a:p>
+        </p:txBody>
+      </p:sp>
+    </p:spTree>
+  </p:cSld>
+  <p:clrMapOvr>
+    <a:masterClrMapping/>
+  </p:clrMapOvr>
+</p:sld>
+</file>
+
+<file path=ppt/slides/slide38.xml><?xml version="1.0" encoding="utf-8"?>
+<p:sld xmlns:a="http://schemas.openxmlformats.org/drawingml/2006/main" xmlns:r="http://schemas.openxmlformats.org/officeDocument/2006/relationships" xmlns:p="http://schemas.openxmlformats.org/presentationml/2006/main">
+  <p:cSld>
+    <p:spTree>
+      <p:nvGrpSpPr>
+        <p:cNvPr id="1" name=""/>
+        <p:cNvGrpSpPr/>
+        <p:nvPr/>
+      </p:nvGrpSpPr>
+      <p:grpSpPr>
+        <a:xfrm>
+          <a:off x="0" y="0"/>
+          <a:ext cx="0" cy="0"/>
+          <a:chOff x="0" y="0"/>
+          <a:chExt cx="0" cy="0"/>
+        </a:xfrm>
+      </p:grpSpPr>
+      <p:sp>
+        <p:nvSpPr>
+          <p:cNvPr id="3" name="TextBox 2"/>
+          <p:cNvSpPr txBox="1"/>
+          <p:nvPr/>
+        </p:nvSpPr>
+        <p:spPr>
+          <a:xfrm flipH="1">
+            <a:off x="685800" y="0"/>
+            <a:ext cx="7879082" cy="400110"/>
+          </a:xfrm>
+          <a:prstGeom prst="rect">
+            <a:avLst/>
+          </a:prstGeom>
+          <a:noFill/>
+        </p:spPr>
+        <p:txBody>
+          <a:bodyPr wrap="square" rtlCol="0">
+            <a:spAutoFit/>
+          </a:bodyPr>
+          <a:lstStyle/>
+          <a:p>
+            <a:r>
+              <a:rPr lang="en-US" sz="2000" dirty="0" err="1">
+                <a:solidFill>
+                  <a:srgbClr val="FF0000"/>
+                </a:solidFill>
+                <a:latin typeface="Arial" pitchFamily="34" charset="0"/>
+                <a:cs typeface="Arial" pitchFamily="34" charset="0"/>
+              </a:rPr>
+              <a:t>rna</a:t>
+            </a:r>
+            <a:r>
+              <a:rPr lang="en-US" sz="2000" dirty="0">
+                <a:solidFill>
+                  <a:srgbClr val="FF0000"/>
+                </a:solidFill>
+                <a:latin typeface="Arial" pitchFamily="34" charset="0"/>
+                <a:cs typeface="Arial" pitchFamily="34" charset="0"/>
+              </a:rPr>
+              <a:t>-seq shows us gene expression of host-associated </a:t>
+            </a:r>
+            <a:r>
+              <a:rPr lang="en-US" sz="2000" i="1" dirty="0">
+                <a:solidFill>
+                  <a:srgbClr val="FF0000"/>
+                </a:solidFill>
+                <a:latin typeface="Arial" pitchFamily="34" charset="0"/>
+                <a:cs typeface="Arial" pitchFamily="34" charset="0"/>
+              </a:rPr>
+              <a:t>E. Coli</a:t>
+            </a:r>
+          </a:p>
+        </p:txBody>
+      </p:sp>
+      <p:grpSp>
+        <p:nvGrpSpPr>
+          <p:cNvPr id="4" name="Group 13"/>
+          <p:cNvGrpSpPr/>
+          <p:nvPr/>
+        </p:nvGrpSpPr>
+        <p:grpSpPr>
+          <a:xfrm>
+            <a:off x="1066800" y="2819400"/>
+            <a:ext cx="7243331" cy="3818433"/>
+            <a:chOff x="87866" y="1134567"/>
+            <a:chExt cx="8675134" cy="4573231"/>
+          </a:xfrm>
+        </p:grpSpPr>
+        <p:sp>
+          <p:nvSpPr>
+            <p:cNvPr id="2" name="TextBox 1"/>
+            <p:cNvSpPr txBox="1"/>
+            <p:nvPr/>
+          </p:nvSpPr>
+          <p:spPr>
+            <a:xfrm>
+              <a:off x="2057398" y="4876800"/>
+              <a:ext cx="2878866" cy="830998"/>
+            </a:xfrm>
+            <a:prstGeom prst="rect">
+              <a:avLst/>
+            </a:prstGeom>
+            <a:noFill/>
+          </p:spPr>
+          <p:txBody>
+            <a:bodyPr wrap="none" rtlCol="0">
+              <a:spAutoFit/>
+            </a:bodyPr>
+            <a:lstStyle/>
+            <a:p>
+              <a:r>
+                <a:rPr lang="en-US" sz="1200" dirty="0">
+                  <a:latin typeface="Arial" pitchFamily="34" charset="0"/>
+                  <a:cs typeface="Arial" pitchFamily="34" charset="0"/>
+                </a:rPr>
+                <a:t>30S ribosomal protein</a:t>
+              </a:r>
+            </a:p>
+            <a:p>
+              <a:r>
+                <a:rPr lang="en-US" sz="1200" dirty="0">
+                  <a:latin typeface="Arial" pitchFamily="34" charset="0"/>
+                  <a:cs typeface="Arial" pitchFamily="34" charset="0"/>
+                </a:rPr>
+                <a:t>50S ribosomal protein</a:t>
+              </a:r>
+            </a:p>
+            <a:p>
+              <a:r>
+                <a:rPr lang="en-US" sz="1200" dirty="0" err="1">
+                  <a:latin typeface="Arial" pitchFamily="34" charset="0"/>
+                  <a:cs typeface="Arial" pitchFamily="34" charset="0"/>
+                </a:rPr>
+                <a:t>preprotein</a:t>
+              </a:r>
+              <a:r>
+                <a:rPr lang="en-US" sz="1200" dirty="0">
+                  <a:latin typeface="Arial" pitchFamily="34" charset="0"/>
+                  <a:cs typeface="Arial" pitchFamily="34" charset="0"/>
+                </a:rPr>
+                <a:t> </a:t>
+              </a:r>
+              <a:r>
+                <a:rPr lang="en-US" sz="1200" dirty="0" err="1">
+                  <a:latin typeface="Arial" pitchFamily="34" charset="0"/>
+                  <a:cs typeface="Arial" pitchFamily="34" charset="0"/>
+                </a:rPr>
+                <a:t>translocase</a:t>
+              </a:r>
+              <a:r>
+                <a:rPr lang="en-US" sz="1200" dirty="0">
+                  <a:latin typeface="Arial" pitchFamily="34" charset="0"/>
+                  <a:cs typeface="Arial" pitchFamily="34" charset="0"/>
+                </a:rPr>
+                <a:t> subunit</a:t>
+              </a:r>
+            </a:p>
+            <a:p>
+              <a:r>
+                <a:rPr lang="en-US" sz="1200" dirty="0">
+                  <a:latin typeface="Arial" pitchFamily="34" charset="0"/>
+                  <a:cs typeface="Arial" pitchFamily="34" charset="0"/>
+                </a:rPr>
+                <a:t>DNA-directed RNA polymerase subunit </a:t>
+              </a:r>
+            </a:p>
+          </p:txBody>
+        </p:sp>
+        <p:pic>
+          <p:nvPicPr>
+            <p:cNvPr id="81921" name="Picture 1"/>
+            <p:cNvPicPr>
+              <a:picLocks noChangeAspect="1" noChangeArrowheads="1"/>
+            </p:cNvPicPr>
+            <p:nvPr/>
+          </p:nvPicPr>
+          <p:blipFill>
+            <a:blip r:embed="rId3" cstate="print"/>
+            <a:srcRect/>
+            <a:stretch>
+              <a:fillRect/>
+            </a:stretch>
+          </p:blipFill>
+          <p:spPr bwMode="auto">
+            <a:xfrm>
+              <a:off x="304798" y="1134567"/>
+              <a:ext cx="5886450" cy="3208833"/>
+            </a:xfrm>
+            <a:prstGeom prst="rect">
+              <a:avLst/>
+            </a:prstGeom>
+            <a:noFill/>
+            <a:ln w="9525">
+              <a:noFill/>
+              <a:miter lim="800000"/>
+              <a:headEnd/>
+              <a:tailEnd/>
+            </a:ln>
+          </p:spPr>
+        </p:pic>
+        <p:sp>
+          <p:nvSpPr>
+            <p:cNvPr id="5" name="TextBox 4"/>
+            <p:cNvSpPr txBox="1"/>
+            <p:nvPr/>
+          </p:nvSpPr>
+          <p:spPr>
+            <a:xfrm>
+              <a:off x="2261364" y="4343400"/>
+              <a:ext cx="2691634" cy="369332"/>
+            </a:xfrm>
+            <a:prstGeom prst="rect">
+              <a:avLst/>
+            </a:prstGeom>
+            <a:noFill/>
+          </p:spPr>
+          <p:txBody>
+            <a:bodyPr wrap="none" rtlCol="0">
+              <a:spAutoFit/>
+            </a:bodyPr>
+            <a:lstStyle/>
+            <a:p>
+              <a:r>
+                <a:rPr lang="en-US" dirty="0"/>
+                <a:t>Position along the genome</a:t>
+              </a:r>
+            </a:p>
+          </p:txBody>
+        </p:sp>
+        <p:sp>
+          <p:nvSpPr>
+            <p:cNvPr id="6" name="TextBox 5"/>
+            <p:cNvSpPr txBox="1"/>
+            <p:nvPr/>
+          </p:nvSpPr>
+          <p:spPr>
+            <a:xfrm rot="16200000">
+              <a:off x="-966686" y="2349952"/>
+              <a:ext cx="2478435" cy="369332"/>
+            </a:xfrm>
+            <a:prstGeom prst="rect">
+              <a:avLst/>
+            </a:prstGeom>
+            <a:noFill/>
+          </p:spPr>
+          <p:txBody>
+            <a:bodyPr wrap="none" rtlCol="0">
+              <a:spAutoFit/>
+            </a:bodyPr>
+            <a:lstStyle/>
+            <a:p>
+              <a:r>
+                <a:rPr lang="en-US" dirty="0"/>
+                <a:t>Normalized Read Count</a:t>
+              </a:r>
+            </a:p>
+          </p:txBody>
+        </p:sp>
+        <p:grpSp>
+          <p:nvGrpSpPr>
+            <p:cNvPr id="7" name="Group 12"/>
+            <p:cNvGrpSpPr/>
+            <p:nvPr/>
+          </p:nvGrpSpPr>
+          <p:grpSpPr>
+            <a:xfrm>
+              <a:off x="6400798" y="1143001"/>
+              <a:ext cx="2362202" cy="1005648"/>
+              <a:chOff x="6400800" y="1143000"/>
+              <a:chExt cx="3042810" cy="1295400"/>
+            </a:xfrm>
+          </p:grpSpPr>
+          <p:pic>
+            <p:nvPicPr>
+              <p:cNvPr id="81922" name="Picture 2"/>
+              <p:cNvPicPr>
+                <a:picLocks noChangeAspect="1" noChangeArrowheads="1"/>
+              </p:cNvPicPr>
+              <p:nvPr/>
+            </p:nvPicPr>
+            <p:blipFill>
+              <a:blip r:embed="rId4" cstate="print"/>
+              <a:srcRect/>
+              <a:stretch>
+                <a:fillRect/>
+              </a:stretch>
+            </p:blipFill>
+            <p:spPr bwMode="auto">
+              <a:xfrm>
+                <a:off x="6400800" y="1666875"/>
+                <a:ext cx="495300" cy="314325"/>
+              </a:xfrm>
+              <a:prstGeom prst="rect">
+                <a:avLst/>
+              </a:prstGeom>
+              <a:noFill/>
+              <a:ln w="9525">
+                <a:noFill/>
+                <a:miter lim="800000"/>
+                <a:headEnd/>
+                <a:tailEnd/>
+              </a:ln>
+            </p:spPr>
+          </p:pic>
+          <p:sp>
+            <p:nvSpPr>
+              <p:cNvPr id="8" name="TextBox 7"/>
+              <p:cNvSpPr txBox="1"/>
+              <p:nvPr/>
+            </p:nvSpPr>
+            <p:spPr>
+              <a:xfrm>
+                <a:off x="6934205" y="1590675"/>
+                <a:ext cx="2509405" cy="369332"/>
+              </a:xfrm>
+              <a:prstGeom prst="rect">
+                <a:avLst/>
+              </a:prstGeom>
+              <a:noFill/>
+            </p:spPr>
+            <p:txBody>
+              <a:bodyPr wrap="none" rtlCol="0">
+                <a:spAutoFit/>
+              </a:bodyPr>
+              <a:lstStyle/>
+              <a:p>
+                <a:r>
+                  <a:rPr lang="en-US" dirty="0"/>
+                  <a:t>12 weeks (inflammation)</a:t>
+                </a:r>
+              </a:p>
+            </p:txBody>
+          </p:sp>
+          <p:pic>
+            <p:nvPicPr>
+              <p:cNvPr id="81923" name="Picture 3"/>
+              <p:cNvPicPr>
+                <a:picLocks noChangeAspect="1" noChangeArrowheads="1"/>
+              </p:cNvPicPr>
+              <p:nvPr/>
+            </p:nvPicPr>
+            <p:blipFill>
+              <a:blip r:embed="rId5" cstate="print"/>
+              <a:srcRect/>
+              <a:stretch>
+                <a:fillRect/>
+              </a:stretch>
+            </p:blipFill>
+            <p:spPr bwMode="auto">
+              <a:xfrm>
+                <a:off x="6400800" y="2124075"/>
+                <a:ext cx="495300" cy="314325"/>
+              </a:xfrm>
+              <a:prstGeom prst="rect">
+                <a:avLst/>
+              </a:prstGeom>
+              <a:noFill/>
+              <a:ln w="9525">
+                <a:noFill/>
+                <a:miter lim="800000"/>
+                <a:headEnd/>
+                <a:tailEnd/>
+              </a:ln>
+            </p:spPr>
+          </p:pic>
+          <p:sp>
+            <p:nvSpPr>
+              <p:cNvPr id="10" name="TextBox 9"/>
+              <p:cNvSpPr txBox="1"/>
+              <p:nvPr/>
+            </p:nvSpPr>
+            <p:spPr>
+              <a:xfrm>
+                <a:off x="6981727" y="2059543"/>
+                <a:ext cx="1872950" cy="369332"/>
+              </a:xfrm>
+              <a:prstGeom prst="rect">
+                <a:avLst/>
+              </a:prstGeom>
+              <a:noFill/>
+            </p:spPr>
+            <p:txBody>
+              <a:bodyPr wrap="none" rtlCol="0">
+                <a:spAutoFit/>
+              </a:bodyPr>
+              <a:lstStyle/>
+              <a:p>
+                <a:r>
+                  <a:rPr lang="en-US" dirty="0"/>
+                  <a:t>18 weeks (cancer)</a:t>
+                </a:r>
+              </a:p>
+            </p:txBody>
+          </p:sp>
+          <p:pic>
+            <p:nvPicPr>
+              <p:cNvPr id="81924" name="Picture 4"/>
+              <p:cNvPicPr>
+                <a:picLocks noChangeAspect="1" noChangeArrowheads="1"/>
+              </p:cNvPicPr>
+              <p:nvPr/>
+            </p:nvPicPr>
+            <p:blipFill>
+              <a:blip r:embed="rId6" cstate="print"/>
+              <a:srcRect/>
+              <a:stretch>
+                <a:fillRect/>
+              </a:stretch>
+            </p:blipFill>
+            <p:spPr bwMode="auto">
+              <a:xfrm>
+                <a:off x="6400800" y="1209675"/>
+                <a:ext cx="495300" cy="314325"/>
+              </a:xfrm>
+              <a:prstGeom prst="rect">
+                <a:avLst/>
+              </a:prstGeom>
+              <a:noFill/>
+              <a:ln w="9525">
+                <a:noFill/>
+                <a:miter lim="800000"/>
+                <a:headEnd/>
+                <a:tailEnd/>
+              </a:ln>
+            </p:spPr>
+          </p:pic>
+          <p:sp>
+            <p:nvSpPr>
+              <p:cNvPr id="12" name="TextBox 11"/>
+              <p:cNvSpPr txBox="1"/>
+              <p:nvPr/>
+            </p:nvSpPr>
+            <p:spPr>
+              <a:xfrm>
+                <a:off x="6989730" y="1143000"/>
+                <a:ext cx="774571" cy="369332"/>
+              </a:xfrm>
+              <a:prstGeom prst="rect">
+                <a:avLst/>
+              </a:prstGeom>
+              <a:noFill/>
+            </p:spPr>
+            <p:txBody>
+              <a:bodyPr wrap="none" rtlCol="0">
+                <a:spAutoFit/>
+              </a:bodyPr>
+              <a:lstStyle/>
+              <a:p>
+                <a:r>
+                  <a:rPr lang="en-US" dirty="0"/>
+                  <a:t>2 days</a:t>
+                </a:r>
+              </a:p>
+            </p:txBody>
+          </p:sp>
+        </p:grpSp>
+      </p:grpSp>
+      <p:sp>
+        <p:nvSpPr>
+          <p:cNvPr id="15" name="TextBox 14"/>
+          <p:cNvSpPr txBox="1"/>
+          <p:nvPr/>
+        </p:nvSpPr>
+        <p:spPr>
+          <a:xfrm>
+            <a:off x="3058368" y="457200"/>
+            <a:ext cx="1285032" cy="369332"/>
+          </a:xfrm>
+          <a:prstGeom prst="rect">
+            <a:avLst/>
+          </a:prstGeom>
+          <a:noFill/>
+        </p:spPr>
+        <p:txBody>
+          <a:bodyPr wrap="none" rtlCol="0">
+            <a:spAutoFit/>
+          </a:bodyPr>
+          <a:lstStyle/>
+          <a:p>
+            <a:r>
+              <a:rPr lang="en-US" dirty="0"/>
+              <a:t>Sterile mice</a:t>
+            </a:r>
+          </a:p>
+        </p:txBody>
+      </p:sp>
+      <p:cxnSp>
+        <p:nvCxnSpPr>
+          <p:cNvPr id="21" name="Straight Arrow Connector 20"/>
+          <p:cNvCxnSpPr/>
+          <p:nvPr/>
+        </p:nvCxnSpPr>
+        <p:spPr>
+          <a:xfrm>
+            <a:off x="3657600" y="762000"/>
+            <a:ext cx="0" cy="457200"/>
+          </a:xfrm>
+          <a:prstGeom prst="straightConnector1">
+            <a:avLst/>
+          </a:prstGeom>
+          <a:ln>
+            <a:tailEnd type="arrow"/>
+          </a:ln>
+        </p:spPr>
+        <p:style>
+          <a:lnRef idx="1">
+            <a:schemeClr val="accent1"/>
+          </a:lnRef>
+          <a:fillRef idx="0">
+            <a:schemeClr val="accent1"/>
+          </a:fillRef>
+          <a:effectRef idx="0">
+            <a:schemeClr val="accent1"/>
+          </a:effectRef>
+          <a:fontRef idx="minor">
+            <a:schemeClr val="tx1"/>
+          </a:fontRef>
+        </p:style>
+      </p:cxnSp>
+      <p:sp>
+        <p:nvSpPr>
+          <p:cNvPr id="22" name="TextBox 21"/>
+          <p:cNvSpPr txBox="1"/>
+          <p:nvPr/>
+        </p:nvSpPr>
+        <p:spPr>
+          <a:xfrm>
+            <a:off x="2438400" y="1219200"/>
+            <a:ext cx="2153346" cy="369332"/>
+          </a:xfrm>
+          <a:prstGeom prst="rect">
+            <a:avLst/>
+          </a:prstGeom>
+          <a:noFill/>
+        </p:spPr>
+        <p:txBody>
+          <a:bodyPr wrap="none" rtlCol="0">
+            <a:spAutoFit/>
+          </a:bodyPr>
+          <a:lstStyle/>
+          <a:p>
+            <a:r>
+              <a:rPr lang="en-US" dirty="0"/>
+              <a:t>Inoculate with </a:t>
+            </a:r>
+            <a:r>
+              <a:rPr lang="en-US" i="1" dirty="0"/>
+              <a:t>E. Coli</a:t>
+            </a:r>
+          </a:p>
+        </p:txBody>
+      </p:sp>
+      <p:sp>
+        <p:nvSpPr>
+          <p:cNvPr id="23" name="TextBox 22"/>
+          <p:cNvSpPr txBox="1"/>
+          <p:nvPr/>
+        </p:nvSpPr>
+        <p:spPr>
+          <a:xfrm>
+            <a:off x="2057400" y="1868269"/>
+            <a:ext cx="3721083" cy="646331"/>
+          </a:xfrm>
+          <a:prstGeom prst="rect">
+            <a:avLst/>
+          </a:prstGeom>
+          <a:noFill/>
+        </p:spPr>
+        <p:txBody>
+          <a:bodyPr wrap="none" rtlCol="0">
+            <a:spAutoFit/>
+          </a:bodyPr>
+          <a:lstStyle/>
+          <a:p>
+            <a:r>
+              <a:rPr lang="en-US" dirty="0"/>
+              <a:t>RNA from fecal samples characterized</a:t>
+            </a:r>
+          </a:p>
+          <a:p>
+            <a:r>
+              <a:rPr lang="en-US" dirty="0"/>
+              <a:t>by RNA-seq on the Illumina platform</a:t>
+            </a:r>
+          </a:p>
+        </p:txBody>
+      </p:sp>
+      <p:cxnSp>
+        <p:nvCxnSpPr>
+          <p:cNvPr id="24" name="Straight Arrow Connector 23"/>
+          <p:cNvCxnSpPr/>
+          <p:nvPr/>
+        </p:nvCxnSpPr>
+        <p:spPr>
+          <a:xfrm>
+            <a:off x="3657600" y="1600200"/>
+            <a:ext cx="0" cy="304800"/>
+          </a:xfrm>
+          <a:prstGeom prst="straightConnector1">
+            <a:avLst/>
+          </a:prstGeom>
+          <a:ln>
+            <a:tailEnd type="arrow"/>
+          </a:ln>
+        </p:spPr>
+        <p:style>
+          <a:lnRef idx="1">
+            <a:schemeClr val="accent1"/>
+          </a:lnRef>
+          <a:fillRef idx="0">
+            <a:schemeClr val="accent1"/>
+          </a:fillRef>
+          <a:effectRef idx="0">
+            <a:schemeClr val="accent1"/>
+          </a:effectRef>
+          <a:fontRef idx="minor">
+            <a:schemeClr val="tx1"/>
+          </a:fontRef>
+        </p:style>
+      </p:cxnSp>
+    </p:spTree>
+  </p:cSld>
+  <p:clrMapOvr>
+    <a:masterClrMapping/>
+  </p:clrMapOvr>
+</p:sld>
+</file>
+
+<file path=ppt/slides/slide39.xml><?xml version="1.0" encoding="utf-8"?>
+<p:sld xmlns:a="http://schemas.openxmlformats.org/drawingml/2006/main" xmlns:r="http://schemas.openxmlformats.org/officeDocument/2006/relationships" xmlns:p="http://schemas.openxmlformats.org/presentationml/2006/main">
+  <p:cSld>
+    <p:spTree>
+      <p:nvGrpSpPr>
+        <p:cNvPr id="1" name=""/>
+        <p:cNvGrpSpPr/>
+        <p:nvPr/>
+      </p:nvGrpSpPr>
+      <p:grpSpPr>
+        <a:xfrm>
+          <a:off x="0" y="0"/>
+          <a:ext cx="0" cy="0"/>
+          <a:chOff x="0" y="0"/>
+          <a:chExt cx="0" cy="0"/>
+        </a:xfrm>
+      </p:grpSpPr>
+      <p:grpSp>
+        <p:nvGrpSpPr>
+          <p:cNvPr id="2" name="Group 1"/>
+          <p:cNvGrpSpPr/>
+          <p:nvPr/>
+        </p:nvGrpSpPr>
+        <p:grpSpPr>
+          <a:xfrm>
+            <a:off x="457200" y="685800"/>
+            <a:ext cx="7543800" cy="5166102"/>
+            <a:chOff x="0" y="395624"/>
+            <a:chExt cx="8991600" cy="6157576"/>
+          </a:xfrm>
+        </p:grpSpPr>
+        <p:pic>
+          <p:nvPicPr>
+            <p:cNvPr id="3" name="Picture 2"/>
+            <p:cNvPicPr>
+              <a:picLocks noChangeAspect="1" noChangeArrowheads="1"/>
+            </p:cNvPicPr>
+            <p:nvPr/>
+          </p:nvPicPr>
+          <p:blipFill>
+            <a:blip r:embed="rId3" cstate="print"/>
+            <a:srcRect/>
+            <a:stretch>
+              <a:fillRect/>
+            </a:stretch>
+          </p:blipFill>
+          <p:spPr bwMode="auto">
+            <a:xfrm>
+              <a:off x="1419225" y="1066800"/>
+              <a:ext cx="7572375" cy="5133975"/>
+            </a:xfrm>
+            <a:prstGeom prst="rect">
+              <a:avLst/>
+            </a:prstGeom>
+            <a:noFill/>
+            <a:ln w="9525">
+              <a:noFill/>
+              <a:miter lim="800000"/>
+              <a:headEnd/>
+              <a:tailEnd/>
+            </a:ln>
+          </p:spPr>
+        </p:pic>
+        <p:sp>
+          <p:nvSpPr>
+            <p:cNvPr id="4" name="TextBox 3"/>
+            <p:cNvSpPr txBox="1"/>
+            <p:nvPr/>
+          </p:nvSpPr>
+          <p:spPr>
+            <a:xfrm>
+              <a:off x="1271539" y="395624"/>
+              <a:ext cx="3894656" cy="369332"/>
+            </a:xfrm>
+            <a:prstGeom prst="rect">
+              <a:avLst/>
+            </a:prstGeom>
+            <a:noFill/>
+          </p:spPr>
+          <p:txBody>
+            <a:bodyPr wrap="none" rtlCol="0">
+              <a:spAutoFit/>
+            </a:bodyPr>
+            <a:lstStyle/>
+            <a:p>
+              <a:r>
+                <a:rPr lang="en-US" dirty="0"/>
+                <a:t>Paired ends are nearly exactly the same</a:t>
+              </a:r>
+            </a:p>
+          </p:txBody>
+        </p:sp>
+        <p:pic>
+          <p:nvPicPr>
+            <p:cNvPr id="5" name="Picture 3"/>
+            <p:cNvPicPr>
+              <a:picLocks noChangeAspect="1" noChangeArrowheads="1"/>
+            </p:cNvPicPr>
+            <p:nvPr/>
+          </p:nvPicPr>
+          <p:blipFill>
+            <a:blip r:embed="rId4" cstate="print"/>
+            <a:srcRect/>
+            <a:stretch>
+              <a:fillRect/>
+            </a:stretch>
+          </p:blipFill>
+          <p:spPr bwMode="auto">
+            <a:xfrm>
+              <a:off x="3429000" y="6172200"/>
+              <a:ext cx="3063875" cy="381000"/>
+            </a:xfrm>
+            <a:prstGeom prst="rect">
+              <a:avLst/>
+            </a:prstGeom>
+            <a:noFill/>
+            <a:ln w="9525">
+              <a:noFill/>
+              <a:miter lim="800000"/>
+              <a:headEnd/>
+              <a:tailEnd/>
+            </a:ln>
+          </p:spPr>
+        </p:pic>
+        <p:pic>
+          <p:nvPicPr>
+            <p:cNvPr id="6" name="Picture 6"/>
+            <p:cNvPicPr>
+              <a:picLocks noChangeAspect="1" noChangeArrowheads="1"/>
+            </p:cNvPicPr>
+            <p:nvPr/>
+          </p:nvPicPr>
+          <p:blipFill>
+            <a:blip r:embed="rId5" cstate="print"/>
+            <a:srcRect/>
+            <a:stretch>
+              <a:fillRect/>
+            </a:stretch>
+          </p:blipFill>
+          <p:spPr bwMode="auto">
+            <a:xfrm>
+              <a:off x="0" y="3581400"/>
+              <a:ext cx="1876425" cy="228600"/>
+            </a:xfrm>
+            <a:prstGeom prst="rect">
+              <a:avLst/>
+            </a:prstGeom>
+            <a:noFill/>
+            <a:ln w="9525">
+              <a:noFill/>
+              <a:miter lim="800000"/>
+              <a:headEnd/>
+              <a:tailEnd/>
+            </a:ln>
+          </p:spPr>
+        </p:pic>
+        <p:cxnSp>
+          <p:nvCxnSpPr>
+            <p:cNvPr id="7" name="Straight Arrow Connector 6"/>
+            <p:cNvCxnSpPr/>
+            <p:nvPr/>
+          </p:nvCxnSpPr>
+          <p:spPr>
+            <a:xfrm rot="16200000" flipH="1">
+              <a:off x="7886700" y="1028700"/>
+              <a:ext cx="914400" cy="381000"/>
+            </a:xfrm>
+            <a:prstGeom prst="straightConnector1">
+              <a:avLst/>
+            </a:prstGeom>
+            <a:ln>
+              <a:tailEnd type="arrow"/>
+            </a:ln>
+          </p:spPr>
+          <p:style>
+            <a:lnRef idx="1">
+              <a:schemeClr val="accent1"/>
+            </a:lnRef>
+            <a:fillRef idx="0">
+              <a:schemeClr val="accent1"/>
+            </a:fillRef>
+            <a:effectRef idx="0">
+              <a:schemeClr val="accent1"/>
+            </a:effectRef>
+            <a:fontRef idx="minor">
+              <a:schemeClr val="tx1"/>
+            </a:fontRef>
+          </p:style>
+        </p:cxnSp>
+        <p:cxnSp>
+          <p:nvCxnSpPr>
+            <p:cNvPr id="8" name="Straight Arrow Connector 7"/>
+            <p:cNvCxnSpPr/>
+            <p:nvPr/>
+          </p:nvCxnSpPr>
+          <p:spPr>
+            <a:xfrm rot="16200000" flipH="1">
+              <a:off x="7391400" y="1143000"/>
+              <a:ext cx="990600" cy="533400"/>
+            </a:xfrm>
+            <a:prstGeom prst="straightConnector1">
+              <a:avLst/>
+            </a:prstGeom>
+            <a:ln>
+              <a:tailEnd type="arrow"/>
+            </a:ln>
+          </p:spPr>
+          <p:style>
+            <a:lnRef idx="1">
+              <a:schemeClr val="accent1"/>
+            </a:lnRef>
+            <a:fillRef idx="0">
+              <a:schemeClr val="accent1"/>
+            </a:fillRef>
+            <a:effectRef idx="0">
+              <a:schemeClr val="accent1"/>
+            </a:effectRef>
+            <a:fontRef idx="minor">
+              <a:schemeClr val="tx1"/>
+            </a:fontRef>
+          </p:style>
+        </p:cxnSp>
+        <p:sp>
+          <p:nvSpPr>
+            <p:cNvPr id="9" name="TextBox 8"/>
+            <p:cNvSpPr txBox="1"/>
+            <p:nvPr/>
+          </p:nvSpPr>
+          <p:spPr>
+            <a:xfrm>
+              <a:off x="7620000" y="457200"/>
+              <a:ext cx="671979" cy="369332"/>
+            </a:xfrm>
+            <a:prstGeom prst="rect">
+              <a:avLst/>
+            </a:prstGeom>
+            <a:noFill/>
+          </p:spPr>
+          <p:txBody>
+            <a:bodyPr wrap="none" rtlCol="0">
+              <a:spAutoFit/>
+            </a:bodyPr>
+            <a:lstStyle/>
+            <a:p>
+              <a:r>
+                <a:rPr lang="en-US" dirty="0" err="1"/>
+                <a:t>rRNA</a:t>
+              </a:r>
+              <a:endParaRPr lang="en-US" dirty="0"/>
+            </a:p>
+          </p:txBody>
+        </p:sp>
+        <p:cxnSp>
+          <p:nvCxnSpPr>
+            <p:cNvPr id="10" name="Straight Arrow Connector 9"/>
+            <p:cNvCxnSpPr/>
+            <p:nvPr/>
+          </p:nvCxnSpPr>
+          <p:spPr>
+            <a:xfrm>
+              <a:off x="6934200" y="2286000"/>
+              <a:ext cx="685800" cy="1588"/>
+            </a:xfrm>
+            <a:prstGeom prst="straightConnector1">
+              <a:avLst/>
+            </a:prstGeom>
+            <a:ln>
+              <a:tailEnd type="arrow"/>
+            </a:ln>
+          </p:spPr>
+          <p:style>
+            <a:lnRef idx="1">
+              <a:schemeClr val="accent1"/>
+            </a:lnRef>
+            <a:fillRef idx="0">
+              <a:schemeClr val="accent1"/>
+            </a:fillRef>
+            <a:effectRef idx="0">
+              <a:schemeClr val="accent1"/>
+            </a:effectRef>
+            <a:fontRef idx="minor">
+              <a:schemeClr val="tx1"/>
+            </a:fontRef>
+          </p:style>
+        </p:cxnSp>
+        <p:sp>
+          <p:nvSpPr>
+            <p:cNvPr id="11" name="TextBox 10"/>
+            <p:cNvSpPr txBox="1"/>
+            <p:nvPr/>
+          </p:nvSpPr>
+          <p:spPr>
+            <a:xfrm>
+              <a:off x="5806224" y="2209800"/>
+              <a:ext cx="1204176" cy="369332"/>
+            </a:xfrm>
+            <a:prstGeom prst="rect">
+              <a:avLst/>
+            </a:prstGeom>
+            <a:noFill/>
+          </p:spPr>
+          <p:txBody>
+            <a:bodyPr wrap="none" rtlCol="0">
+              <a:spAutoFit/>
+            </a:bodyPr>
+            <a:lstStyle/>
+            <a:p>
+              <a:r>
+                <a:rPr lang="en-US" dirty="0"/>
+                <a:t>unmapped</a:t>
+              </a:r>
+            </a:p>
+          </p:txBody>
+        </p:sp>
+      </p:grpSp>
+      <p:sp>
+        <p:nvSpPr>
+          <p:cNvPr id="12" name="TextBox 11"/>
+          <p:cNvSpPr txBox="1"/>
+          <p:nvPr/>
+        </p:nvSpPr>
+        <p:spPr>
+          <a:xfrm>
+            <a:off x="304800" y="0"/>
+            <a:ext cx="2415790" cy="369332"/>
+          </a:xfrm>
+          <a:prstGeom prst="rect">
+            <a:avLst/>
+          </a:prstGeom>
+          <a:noFill/>
+        </p:spPr>
+        <p:txBody>
+          <a:bodyPr wrap="none" rtlCol="0">
+            <a:spAutoFit/>
+          </a:bodyPr>
+          <a:lstStyle/>
+          <a:p>
+            <a:r>
+              <a:rPr lang="en-US" dirty="0"/>
+              <a:t>Features of the dataset:</a:t>
+            </a:r>
+          </a:p>
+        </p:txBody>
+      </p:sp>
+      <p:sp>
+        <p:nvSpPr>
+          <p:cNvPr id="13" name="TextBox 12"/>
+          <p:cNvSpPr txBox="1"/>
+          <p:nvPr/>
+        </p:nvSpPr>
+        <p:spPr>
+          <a:xfrm>
+            <a:off x="762000" y="6096000"/>
+            <a:ext cx="7313669" cy="369332"/>
+          </a:xfrm>
+          <a:prstGeom prst="rect">
+            <a:avLst/>
+          </a:prstGeom>
+          <a:noFill/>
+        </p:spPr>
+        <p:txBody>
+          <a:bodyPr wrap="none" rtlCol="0">
+            <a:spAutoFit/>
+          </a:bodyPr>
+          <a:lstStyle/>
+          <a:p>
+            <a:r>
+              <a:rPr lang="en-US" dirty="0"/>
+              <a:t>In your spreadsheet for the homework, we simply merged the paired ends… </a:t>
+            </a:r>
+          </a:p>
+        </p:txBody>
+      </p:sp>
+    </p:spTree>
+  </p:cSld>
+  <p:clrMapOvr>
+    <a:masterClrMapping/>
+  </p:clrMapOvr>
+</p:sld>
+</file>
+
 <file path=ppt/slides/slide4.xml><?xml version="1.0" encoding="utf-8"?>
 <p:sld xmlns:a="http://schemas.openxmlformats.org/drawingml/2006/main" xmlns:r="http://schemas.openxmlformats.org/officeDocument/2006/relationships" xmlns:p="http://schemas.openxmlformats.org/presentationml/2006/main">
   <p:cSld>
@@ -8546,6 +11724,612 @@
             <a:r>
               <a:rPr lang="en-US" dirty="0"/>
               <a:t>Notice the slight discontinuity left from our prior…</a:t>
+            </a:r>
+          </a:p>
+        </p:txBody>
+      </p:sp>
+    </p:spTree>
+  </p:cSld>
+  <p:clrMapOvr>
+    <a:masterClrMapping/>
+  </p:clrMapOvr>
+</p:sld>
+</file>
+
+<file path=ppt/slides/slide40.xml><?xml version="1.0" encoding="utf-8"?>
+<p:sld xmlns:a="http://schemas.openxmlformats.org/drawingml/2006/main" xmlns:r="http://schemas.openxmlformats.org/officeDocument/2006/relationships" xmlns:p="http://schemas.openxmlformats.org/presentationml/2006/main">
+  <p:cSld>
+    <p:spTree>
+      <p:nvGrpSpPr>
+        <p:cNvPr id="1" name=""/>
+        <p:cNvGrpSpPr/>
+        <p:nvPr/>
+      </p:nvGrpSpPr>
+      <p:grpSpPr>
+        <a:xfrm>
+          <a:off x="0" y="0"/>
+          <a:ext cx="0" cy="0"/>
+          <a:chOff x="0" y="0"/>
+          <a:chExt cx="0" cy="0"/>
+        </a:xfrm>
+      </p:grpSpPr>
+      <p:sp>
+        <p:nvSpPr>
+          <p:cNvPr id="2" name="TextBox 1"/>
+          <p:cNvSpPr txBox="1"/>
+          <p:nvPr/>
+        </p:nvSpPr>
+        <p:spPr>
+          <a:xfrm>
+            <a:off x="381000" y="0"/>
+            <a:ext cx="8103757" cy="1477328"/>
+          </a:xfrm>
+          <a:prstGeom prst="rect">
+            <a:avLst/>
+          </a:prstGeom>
+          <a:noFill/>
+        </p:spPr>
+        <p:txBody>
+          <a:bodyPr wrap="none" rtlCol="0">
+            <a:spAutoFit/>
+          </a:bodyPr>
+          <a:lstStyle/>
+          <a:p>
+            <a:r>
+              <a:rPr lang="en-US" dirty="0"/>
+              <a:t>One potential problem with this dataset.</a:t>
+            </a:r>
+          </a:p>
+          <a:p>
+            <a:r>
+              <a:rPr lang="en-US" dirty="0"/>
+              <a:t>Most of the sequences were 16S and 23S </a:t>
+            </a:r>
+            <a:r>
+              <a:rPr lang="en-US" dirty="0" err="1"/>
+              <a:t>rRNA</a:t>
+            </a:r>
+            <a:endParaRPr lang="en-US" dirty="0"/>
+          </a:p>
+          <a:p>
+            <a:endParaRPr lang="en-US" dirty="0"/>
+          </a:p>
+          <a:p>
+            <a:r>
+              <a:rPr lang="en-US" dirty="0"/>
+              <a:t>(Bacteria do not have a poly-A tail on their mRNA ) </a:t>
+            </a:r>
+          </a:p>
+          <a:p>
+            <a:r>
+              <a:rPr lang="en-US" dirty="0"/>
+              <a:t>(We used a bead capture method to remove the </a:t>
+            </a:r>
+            <a:r>
+              <a:rPr lang="en-US" dirty="0" err="1"/>
+              <a:t>rRNA</a:t>
+            </a:r>
+            <a:r>
+              <a:rPr lang="en-US" dirty="0"/>
+              <a:t> signature with limited success)</a:t>
+            </a:r>
+          </a:p>
+        </p:txBody>
+      </p:sp>
+      <p:grpSp>
+        <p:nvGrpSpPr>
+          <p:cNvPr id="12" name="Group 11"/>
+          <p:cNvGrpSpPr/>
+          <p:nvPr/>
+        </p:nvGrpSpPr>
+        <p:grpSpPr>
+          <a:xfrm>
+            <a:off x="609600" y="1447800"/>
+            <a:ext cx="7543800" cy="5166102"/>
+            <a:chOff x="0" y="395624"/>
+            <a:chExt cx="8991600" cy="6157576"/>
+          </a:xfrm>
+        </p:grpSpPr>
+        <p:pic>
+          <p:nvPicPr>
+            <p:cNvPr id="3" name="Picture 2"/>
+            <p:cNvPicPr>
+              <a:picLocks noChangeAspect="1" noChangeArrowheads="1"/>
+            </p:cNvPicPr>
+            <p:nvPr/>
+          </p:nvPicPr>
+          <p:blipFill>
+            <a:blip r:embed="rId3" cstate="print"/>
+            <a:srcRect/>
+            <a:stretch>
+              <a:fillRect/>
+            </a:stretch>
+          </p:blipFill>
+          <p:spPr bwMode="auto">
+            <a:xfrm>
+              <a:off x="1419225" y="1066800"/>
+              <a:ext cx="7572375" cy="5133975"/>
+            </a:xfrm>
+            <a:prstGeom prst="rect">
+              <a:avLst/>
+            </a:prstGeom>
+            <a:noFill/>
+            <a:ln w="9525">
+              <a:noFill/>
+              <a:miter lim="800000"/>
+              <a:headEnd/>
+              <a:tailEnd/>
+            </a:ln>
+          </p:spPr>
+        </p:pic>
+        <p:sp>
+          <p:nvSpPr>
+            <p:cNvPr id="4" name="TextBox 3"/>
+            <p:cNvSpPr txBox="1"/>
+            <p:nvPr/>
+          </p:nvSpPr>
+          <p:spPr>
+            <a:xfrm>
+              <a:off x="1271539" y="395624"/>
+              <a:ext cx="220184" cy="440214"/>
+            </a:xfrm>
+            <a:prstGeom prst="rect">
+              <a:avLst/>
+            </a:prstGeom>
+            <a:noFill/>
+          </p:spPr>
+          <p:txBody>
+            <a:bodyPr wrap="none" rtlCol="0">
+              <a:spAutoFit/>
+            </a:bodyPr>
+            <a:lstStyle/>
+            <a:p>
+              <a:endParaRPr lang="en-US" dirty="0"/>
+            </a:p>
+          </p:txBody>
+        </p:sp>
+        <p:pic>
+          <p:nvPicPr>
+            <p:cNvPr id="5" name="Picture 3"/>
+            <p:cNvPicPr>
+              <a:picLocks noChangeAspect="1" noChangeArrowheads="1"/>
+            </p:cNvPicPr>
+            <p:nvPr/>
+          </p:nvPicPr>
+          <p:blipFill>
+            <a:blip r:embed="rId4" cstate="print"/>
+            <a:srcRect/>
+            <a:stretch>
+              <a:fillRect/>
+            </a:stretch>
+          </p:blipFill>
+          <p:spPr bwMode="auto">
+            <a:xfrm>
+              <a:off x="3429000" y="6172200"/>
+              <a:ext cx="3063875" cy="381000"/>
+            </a:xfrm>
+            <a:prstGeom prst="rect">
+              <a:avLst/>
+            </a:prstGeom>
+            <a:noFill/>
+            <a:ln w="9525">
+              <a:noFill/>
+              <a:miter lim="800000"/>
+              <a:headEnd/>
+              <a:tailEnd/>
+            </a:ln>
+          </p:spPr>
+        </p:pic>
+        <p:pic>
+          <p:nvPicPr>
+            <p:cNvPr id="6" name="Picture 6"/>
+            <p:cNvPicPr>
+              <a:picLocks noChangeAspect="1" noChangeArrowheads="1"/>
+            </p:cNvPicPr>
+            <p:nvPr/>
+          </p:nvPicPr>
+          <p:blipFill>
+            <a:blip r:embed="rId5" cstate="print"/>
+            <a:srcRect/>
+            <a:stretch>
+              <a:fillRect/>
+            </a:stretch>
+          </p:blipFill>
+          <p:spPr bwMode="auto">
+            <a:xfrm>
+              <a:off x="0" y="3581400"/>
+              <a:ext cx="1876425" cy="228600"/>
+            </a:xfrm>
+            <a:prstGeom prst="rect">
+              <a:avLst/>
+            </a:prstGeom>
+            <a:noFill/>
+            <a:ln w="9525">
+              <a:noFill/>
+              <a:miter lim="800000"/>
+              <a:headEnd/>
+              <a:tailEnd/>
+            </a:ln>
+          </p:spPr>
+        </p:pic>
+        <p:cxnSp>
+          <p:nvCxnSpPr>
+            <p:cNvPr id="7" name="Straight Arrow Connector 6"/>
+            <p:cNvCxnSpPr/>
+            <p:nvPr/>
+          </p:nvCxnSpPr>
+          <p:spPr>
+            <a:xfrm rot="16200000" flipH="1">
+              <a:off x="7886700" y="1028700"/>
+              <a:ext cx="914400" cy="381000"/>
+            </a:xfrm>
+            <a:prstGeom prst="straightConnector1">
+              <a:avLst/>
+            </a:prstGeom>
+            <a:ln>
+              <a:tailEnd type="arrow"/>
+            </a:ln>
+          </p:spPr>
+          <p:style>
+            <a:lnRef idx="1">
+              <a:schemeClr val="accent1"/>
+            </a:lnRef>
+            <a:fillRef idx="0">
+              <a:schemeClr val="accent1"/>
+            </a:fillRef>
+            <a:effectRef idx="0">
+              <a:schemeClr val="accent1"/>
+            </a:effectRef>
+            <a:fontRef idx="minor">
+              <a:schemeClr val="tx1"/>
+            </a:fontRef>
+          </p:style>
+        </p:cxnSp>
+        <p:cxnSp>
+          <p:nvCxnSpPr>
+            <p:cNvPr id="8" name="Straight Arrow Connector 7"/>
+            <p:cNvCxnSpPr/>
+            <p:nvPr/>
+          </p:nvCxnSpPr>
+          <p:spPr>
+            <a:xfrm rot="16200000" flipH="1">
+              <a:off x="7391400" y="1143000"/>
+              <a:ext cx="990600" cy="533400"/>
+            </a:xfrm>
+            <a:prstGeom prst="straightConnector1">
+              <a:avLst/>
+            </a:prstGeom>
+            <a:ln>
+              <a:tailEnd type="arrow"/>
+            </a:ln>
+          </p:spPr>
+          <p:style>
+            <a:lnRef idx="1">
+              <a:schemeClr val="accent1"/>
+            </a:lnRef>
+            <a:fillRef idx="0">
+              <a:schemeClr val="accent1"/>
+            </a:fillRef>
+            <a:effectRef idx="0">
+              <a:schemeClr val="accent1"/>
+            </a:effectRef>
+            <a:fontRef idx="minor">
+              <a:schemeClr val="tx1"/>
+            </a:fontRef>
+          </p:style>
+        </p:cxnSp>
+        <p:sp>
+          <p:nvSpPr>
+            <p:cNvPr id="9" name="TextBox 8"/>
+            <p:cNvSpPr txBox="1"/>
+            <p:nvPr/>
+          </p:nvSpPr>
+          <p:spPr>
+            <a:xfrm>
+              <a:off x="7620000" y="457200"/>
+              <a:ext cx="671979" cy="369332"/>
+            </a:xfrm>
+            <a:prstGeom prst="rect">
+              <a:avLst/>
+            </a:prstGeom>
+            <a:noFill/>
+          </p:spPr>
+          <p:txBody>
+            <a:bodyPr wrap="none" rtlCol="0">
+              <a:spAutoFit/>
+            </a:bodyPr>
+            <a:lstStyle/>
+            <a:p>
+              <a:r>
+                <a:rPr lang="en-US" dirty="0" err="1"/>
+                <a:t>rRNA</a:t>
+              </a:r>
+              <a:endParaRPr lang="en-US" dirty="0"/>
+            </a:p>
+          </p:txBody>
+        </p:sp>
+        <p:cxnSp>
+          <p:nvCxnSpPr>
+            <p:cNvPr id="10" name="Straight Arrow Connector 9"/>
+            <p:cNvCxnSpPr/>
+            <p:nvPr/>
+          </p:nvCxnSpPr>
+          <p:spPr>
+            <a:xfrm>
+              <a:off x="6934200" y="2286000"/>
+              <a:ext cx="685800" cy="1588"/>
+            </a:xfrm>
+            <a:prstGeom prst="straightConnector1">
+              <a:avLst/>
+            </a:prstGeom>
+            <a:ln>
+              <a:tailEnd type="arrow"/>
+            </a:ln>
+          </p:spPr>
+          <p:style>
+            <a:lnRef idx="1">
+              <a:schemeClr val="accent1"/>
+            </a:lnRef>
+            <a:fillRef idx="0">
+              <a:schemeClr val="accent1"/>
+            </a:fillRef>
+            <a:effectRef idx="0">
+              <a:schemeClr val="accent1"/>
+            </a:effectRef>
+            <a:fontRef idx="minor">
+              <a:schemeClr val="tx1"/>
+            </a:fontRef>
+          </p:style>
+        </p:cxnSp>
+        <p:sp>
+          <p:nvSpPr>
+            <p:cNvPr id="11" name="TextBox 10"/>
+            <p:cNvSpPr txBox="1"/>
+            <p:nvPr/>
+          </p:nvSpPr>
+          <p:spPr>
+            <a:xfrm>
+              <a:off x="5806224" y="2209800"/>
+              <a:ext cx="1204176" cy="369332"/>
+            </a:xfrm>
+            <a:prstGeom prst="rect">
+              <a:avLst/>
+            </a:prstGeom>
+            <a:noFill/>
+          </p:spPr>
+          <p:txBody>
+            <a:bodyPr wrap="none" rtlCol="0">
+              <a:spAutoFit/>
+            </a:bodyPr>
+            <a:lstStyle/>
+            <a:p>
+              <a:r>
+                <a:rPr lang="en-US" dirty="0"/>
+                <a:t>unmapped</a:t>
+              </a:r>
+            </a:p>
+          </p:txBody>
+        </p:sp>
+      </p:grpSp>
+    </p:spTree>
+  </p:cSld>
+  <p:clrMapOvr>
+    <a:masterClrMapping/>
+  </p:clrMapOvr>
+</p:sld>
+</file>
+
+<file path=ppt/slides/slide41.xml><?xml version="1.0" encoding="utf-8"?>
+<p:sld xmlns:a="http://schemas.openxmlformats.org/drawingml/2006/main" xmlns:r="http://schemas.openxmlformats.org/officeDocument/2006/relationships" xmlns:p="http://schemas.openxmlformats.org/presentationml/2006/main">
+  <p:cSld>
+    <p:spTree>
+      <p:nvGrpSpPr>
+        <p:cNvPr id="1" name=""/>
+        <p:cNvGrpSpPr/>
+        <p:nvPr/>
+      </p:nvGrpSpPr>
+      <p:grpSpPr>
+        <a:xfrm>
+          <a:off x="0" y="0"/>
+          <a:ext cx="0" cy="0"/>
+          <a:chOff x="0" y="0"/>
+          <a:chExt cx="0" cy="0"/>
+        </a:xfrm>
+      </p:grpSpPr>
+      <p:sp>
+        <p:nvSpPr>
+          <p:cNvPr id="2" name="TextBox 1"/>
+          <p:cNvSpPr txBox="1"/>
+          <p:nvPr/>
+        </p:nvSpPr>
+        <p:spPr>
+          <a:xfrm>
+            <a:off x="457200" y="0"/>
+            <a:ext cx="5999206" cy="923330"/>
+          </a:xfrm>
+          <a:prstGeom prst="rect">
+            <a:avLst/>
+          </a:prstGeom>
+          <a:noFill/>
+        </p:spPr>
+        <p:txBody>
+          <a:bodyPr wrap="none" rtlCol="0">
+            <a:spAutoFit/>
+          </a:bodyPr>
+          <a:lstStyle/>
+          <a:p>
+            <a:r>
+              <a:rPr lang="en-US" dirty="0"/>
+              <a:t>The fraction of 16S </a:t>
+            </a:r>
+            <a:r>
+              <a:rPr lang="en-US" dirty="0" err="1"/>
+              <a:t>rRNA</a:t>
+            </a:r>
+            <a:r>
+              <a:rPr lang="en-US" dirty="0"/>
+              <a:t> was correlated with time!</a:t>
+            </a:r>
+          </a:p>
+          <a:p>
+            <a:r>
+              <a:rPr lang="en-US" dirty="0"/>
+              <a:t>(The ribosomal machinery changes with the state of the bug?)</a:t>
+            </a:r>
+          </a:p>
+          <a:p>
+            <a:r>
+              <a:rPr lang="en-US" dirty="0"/>
+              <a:t>A potentially confounding variable…</a:t>
+            </a:r>
+          </a:p>
+        </p:txBody>
+      </p:sp>
+      <p:pic>
+        <p:nvPicPr>
+          <p:cNvPr id="3" name="Picture 2"/>
+          <p:cNvPicPr>
+            <a:picLocks noChangeAspect="1" noChangeArrowheads="1"/>
+          </p:cNvPicPr>
+          <p:nvPr/>
+        </p:nvPicPr>
+        <p:blipFill>
+          <a:blip r:embed="rId3" cstate="print"/>
+          <a:srcRect/>
+          <a:stretch>
+            <a:fillRect/>
+          </a:stretch>
+        </p:blipFill>
+        <p:spPr bwMode="auto">
+          <a:xfrm>
+            <a:off x="685800" y="1066800"/>
+            <a:ext cx="8244086" cy="4176712"/>
+          </a:xfrm>
+          <a:prstGeom prst="rect">
+            <a:avLst/>
+          </a:prstGeom>
+          <a:noFill/>
+          <a:ln w="9525">
+            <a:noFill/>
+            <a:miter lim="800000"/>
+            <a:headEnd/>
+            <a:tailEnd/>
+          </a:ln>
+        </p:spPr>
+      </p:pic>
+      <p:sp>
+        <p:nvSpPr>
+          <p:cNvPr id="4" name="TextBox 3"/>
+          <p:cNvSpPr txBox="1"/>
+          <p:nvPr/>
+        </p:nvSpPr>
+        <p:spPr>
+          <a:xfrm rot="16200000">
+            <a:off x="-1337622" y="2861624"/>
+            <a:ext cx="3349378" cy="369332"/>
+          </a:xfrm>
+          <a:prstGeom prst="rect">
+            <a:avLst/>
+          </a:prstGeom>
+          <a:noFill/>
+        </p:spPr>
+        <p:txBody>
+          <a:bodyPr wrap="none" rtlCol="0">
+            <a:spAutoFit/>
+          </a:bodyPr>
+          <a:lstStyle/>
+          <a:p>
+            <a:r>
+              <a:rPr lang="en-US" dirty="0"/>
+              <a:t>16s </a:t>
+            </a:r>
+            <a:r>
+              <a:rPr lang="en-US" dirty="0" err="1"/>
+              <a:t>rRNA</a:t>
+            </a:r>
+            <a:r>
+              <a:rPr lang="en-US" dirty="0"/>
+              <a:t> reads + 23s </a:t>
+            </a:r>
+            <a:r>
+              <a:rPr lang="en-US" dirty="0" err="1"/>
+              <a:t>rRNA</a:t>
+            </a:r>
+            <a:r>
+              <a:rPr lang="en-US" dirty="0"/>
+              <a:t> reads</a:t>
+            </a:r>
+          </a:p>
+        </p:txBody>
+      </p:sp>
+      <p:sp>
+        <p:nvSpPr>
+          <p:cNvPr id="5" name="TextBox 4"/>
+          <p:cNvSpPr txBox="1"/>
+          <p:nvPr/>
+        </p:nvSpPr>
+        <p:spPr>
+          <a:xfrm>
+            <a:off x="3402576" y="5410200"/>
+            <a:ext cx="1550424" cy="369332"/>
+          </a:xfrm>
+          <a:prstGeom prst="rect">
+            <a:avLst/>
+          </a:prstGeom>
+          <a:noFill/>
+        </p:spPr>
+        <p:txBody>
+          <a:bodyPr wrap="none" rtlCol="0">
+            <a:spAutoFit/>
+          </a:bodyPr>
+          <a:lstStyle/>
+          <a:p>
+            <a:r>
+              <a:rPr lang="en-US" dirty="0"/>
+              <a:t>Sample names</a:t>
+            </a:r>
+          </a:p>
+        </p:txBody>
+      </p:sp>
+      <p:sp>
+        <p:nvSpPr>
+          <p:cNvPr id="6" name="TextBox 5"/>
+          <p:cNvSpPr txBox="1"/>
+          <p:nvPr/>
+        </p:nvSpPr>
+        <p:spPr>
+          <a:xfrm>
+            <a:off x="609600" y="5754469"/>
+            <a:ext cx="8153400" cy="646331"/>
+          </a:xfrm>
+          <a:prstGeom prst="rect">
+            <a:avLst/>
+          </a:prstGeom>
+          <a:noFill/>
+        </p:spPr>
+        <p:txBody>
+          <a:bodyPr wrap="square" rtlCol="0">
+            <a:spAutoFit/>
+          </a:bodyPr>
+          <a:lstStyle/>
+          <a:p>
+            <a:r>
+              <a:rPr lang="en-US" dirty="0"/>
+              <a:t>In your spreadsheet, we removed the 16S and 23S </a:t>
+            </a:r>
+            <a:r>
+              <a:rPr lang="en-US" dirty="0" err="1"/>
+              <a:t>rRNA</a:t>
+            </a:r>
+            <a:r>
+              <a:rPr lang="en-US" dirty="0"/>
+              <a:t> sequences</a:t>
+            </a:r>
+          </a:p>
+          <a:p>
+            <a:r>
+              <a:rPr lang="en-US" dirty="0"/>
+              <a:t>and we will do normalization on the resulting counts…</a:t>
             </a:r>
           </a:p>
         </p:txBody>
@@ -8577,14 +12361,20 @@
       </p:grpSpPr>
       <p:sp>
         <p:nvSpPr>
-          <p:cNvPr id="4" name="TextBox 3"/>
+          <p:cNvPr id="6" name="TextBox 5">
+            <a:extLst>
+              <a:ext uri="{FF2B5EF4-FFF2-40B4-BE49-F238E27FC236}">
+                <a16:creationId xmlns:a16="http://schemas.microsoft.com/office/drawing/2014/main" id="{1AC381FA-940D-4AC4-90F7-67489CBE2F63}"/>
+              </a:ext>
+            </a:extLst>
+          </p:cNvPr>
           <p:cNvSpPr txBox="1"/>
           <p:nvPr/>
         </p:nvSpPr>
         <p:spPr>
           <a:xfrm>
             <a:off x="304800" y="228600"/>
-            <a:ext cx="8885894" cy="1200329"/>
+            <a:ext cx="8885894" cy="1477328"/>
           </a:xfrm>
           <a:prstGeom prst="rect">
             <a:avLst/>
@@ -8599,7 +12389,7 @@
           <a:p>
             <a:r>
               <a:rPr lang="en-US" dirty="0"/>
-              <a:t>Better visualization of the Metropolitan algorithm</a:t>
+              <a:t>One last prior</a:t>
             </a:r>
           </a:p>
           <a:p>
@@ -8623,19 +12413,31 @@
             </a:r>
           </a:p>
           <a:p>
+            <a:r>
+              <a:rPr lang="en-US" dirty="0"/>
+              <a:t>Dataset for the next lab </a:t>
+            </a:r>
+          </a:p>
+          <a:p>
             <a:endParaRPr lang="en-US" dirty="0"/>
           </a:p>
         </p:txBody>
       </p:sp>
       <p:cxnSp>
         <p:nvCxnSpPr>
-          <p:cNvPr id="5" name="Straight Arrow Connector 4"/>
+          <p:cNvPr id="7" name="Straight Arrow Connector 6">
+            <a:extLst>
+              <a:ext uri="{FF2B5EF4-FFF2-40B4-BE49-F238E27FC236}">
+                <a16:creationId xmlns:a16="http://schemas.microsoft.com/office/drawing/2014/main" id="{B0F67BB3-FC7D-44BD-A3CD-2C67B70DCEC2}"/>
+              </a:ext>
+            </a:extLst>
+          </p:cNvPr>
           <p:cNvCxnSpPr/>
           <p:nvPr/>
         </p:nvCxnSpPr>
         <p:spPr>
           <a:xfrm flipH="1">
-            <a:off x="3657600" y="685800"/>
+            <a:off x="3581400" y="685800"/>
             <a:ext cx="533400" cy="0"/>
           </a:xfrm>
           <a:prstGeom prst="straightConnector1">

</xml_diff>